<commit_message>
add pictures for diagrams
</commit_message>
<xml_diff>
--- a/QC Coders - Quad Cities Veterans Outreach Center.pptx
+++ b/QC Coders - Quad Cities Veterans Outreach Center.pptx
@@ -344,7 +344,7 @@
           <a:p>
             <a:fld id="{709A5CD8-DDA3-470B-ABD7-F23C1DFAC626}" type="datetimeFigureOut">
               <a:rPr lang="en-US" smtClean="0"/>
-              <a:t>12/16/2018</a:t>
+              <a:t>12/17/2018</a:t>
             </a:fld>
             <a:endParaRPr lang="en-US"/>
           </a:p>
@@ -552,7 +552,7 @@
           <a:p>
             <a:fld id="{709A5CD8-DDA3-470B-ABD7-F23C1DFAC626}" type="datetimeFigureOut">
               <a:rPr lang="en-US" smtClean="0"/>
-              <a:t>12/16/2018</a:t>
+              <a:t>12/17/2018</a:t>
             </a:fld>
             <a:endParaRPr lang="en-US"/>
           </a:p>
@@ -808,7 +808,7 @@
           <a:p>
             <a:fld id="{709A5CD8-DDA3-470B-ABD7-F23C1DFAC626}" type="datetimeFigureOut">
               <a:rPr lang="en-US" smtClean="0"/>
-              <a:t>12/16/2018</a:t>
+              <a:t>12/17/2018</a:t>
             </a:fld>
             <a:endParaRPr lang="en-US"/>
           </a:p>
@@ -982,7 +982,7 @@
           <a:p>
             <a:fld id="{709A5CD8-DDA3-470B-ABD7-F23C1DFAC626}" type="datetimeFigureOut">
               <a:rPr lang="en-US" smtClean="0"/>
-              <a:t>12/16/2018</a:t>
+              <a:t>12/17/2018</a:t>
             </a:fld>
             <a:endParaRPr lang="en-US"/>
           </a:p>
@@ -1325,7 +1325,7 @@
           <a:p>
             <a:fld id="{709A5CD8-DDA3-470B-ABD7-F23C1DFAC626}" type="datetimeFigureOut">
               <a:rPr lang="en-US" smtClean="0"/>
-              <a:t>12/16/2018</a:t>
+              <a:t>12/17/2018</a:t>
             </a:fld>
             <a:endParaRPr lang="en-US"/>
           </a:p>
@@ -1600,7 +1600,7 @@
           <a:p>
             <a:fld id="{709A5CD8-DDA3-470B-ABD7-F23C1DFAC626}" type="datetimeFigureOut">
               <a:rPr lang="en-US" smtClean="0"/>
-              <a:t>12/16/2018</a:t>
+              <a:t>12/17/2018</a:t>
             </a:fld>
             <a:endParaRPr lang="en-US"/>
           </a:p>
@@ -1979,7 +1979,7 @@
           <a:p>
             <a:fld id="{709A5CD8-DDA3-470B-ABD7-F23C1DFAC626}" type="datetimeFigureOut">
               <a:rPr lang="en-US" smtClean="0"/>
-              <a:t>12/16/2018</a:t>
+              <a:t>12/17/2018</a:t>
             </a:fld>
             <a:endParaRPr lang="en-US"/>
           </a:p>
@@ -2097,7 +2097,7 @@
           <a:p>
             <a:fld id="{709A5CD8-DDA3-470B-ABD7-F23C1DFAC626}" type="datetimeFigureOut">
               <a:rPr lang="en-US" smtClean="0"/>
-              <a:t>12/16/2018</a:t>
+              <a:t>12/17/2018</a:t>
             </a:fld>
             <a:endParaRPr lang="en-US"/>
           </a:p>
@@ -2268,7 +2268,7 @@
           <a:p>
             <a:fld id="{709A5CD8-DDA3-470B-ABD7-F23C1DFAC626}" type="datetimeFigureOut">
               <a:rPr lang="en-US" smtClean="0"/>
-              <a:t>12/16/2018</a:t>
+              <a:t>12/17/2018</a:t>
             </a:fld>
             <a:endParaRPr lang="en-US"/>
           </a:p>
@@ -2622,7 +2622,7 @@
           <a:p>
             <a:fld id="{709A5CD8-DDA3-470B-ABD7-F23C1DFAC626}" type="datetimeFigureOut">
               <a:rPr lang="en-US" smtClean="0"/>
-              <a:t>12/16/2018</a:t>
+              <a:t>12/17/2018</a:t>
             </a:fld>
             <a:endParaRPr lang="en-US"/>
           </a:p>
@@ -3004,7 +3004,7 @@
           <a:p>
             <a:fld id="{709A5CD8-DDA3-470B-ABD7-F23C1DFAC626}" type="datetimeFigureOut">
               <a:rPr lang="en-US" smtClean="0"/>
-              <a:t>12/16/2018</a:t>
+              <a:t>12/17/2018</a:t>
             </a:fld>
             <a:endParaRPr lang="en-US"/>
           </a:p>
@@ -3291,7 +3291,7 @@
           <a:p>
             <a:fld id="{709A5CD8-DDA3-470B-ABD7-F23C1DFAC626}" type="datetimeFigureOut">
               <a:rPr lang="en-US" smtClean="0"/>
-              <a:t>12/16/2018</a:t>
+              <a:t>12/17/2018</a:t>
             </a:fld>
             <a:endParaRPr lang="en-US"/>
           </a:p>
@@ -4153,80 +4153,216 @@
           </a:p>
         </p:txBody>
       </p:sp>
-      <p:sp>
-        <p:nvSpPr>
-          <p:cNvPr id="3" name="Content Placeholder 2"/>
-          <p:cNvSpPr>
-            <a:spLocks noGrp="1"/>
-          </p:cNvSpPr>
-          <p:nvPr>
-            <p:ph idx="1"/>
-          </p:nvPr>
-        </p:nvSpPr>
-        <p:spPr/>
-        <p:txBody>
-          <a:bodyPr/>
-          <a:lstStyle/>
-          <a:p>
-            <a:pPr lvl="1">
-              <a:buFont typeface="Wingdings" panose="05000000000000000000" pitchFamily="2" charset="2"/>
-              <a:buChar char="§"/>
-            </a:pPr>
-            <a:r>
-              <a:rPr lang="en-US" dirty="0" smtClean="0"/>
-              <a:t>Cloud hosted</a:t>
-            </a:r>
-          </a:p>
-          <a:p>
-            <a:pPr lvl="1">
-              <a:buFont typeface="Wingdings" panose="05000000000000000000" pitchFamily="2" charset="2"/>
-              <a:buChar char="§"/>
-            </a:pPr>
-            <a:r>
-              <a:rPr lang="en-US" dirty="0" smtClean="0"/>
-              <a:t>PostgreSQL – Amazon RDS</a:t>
-            </a:r>
-          </a:p>
-          <a:p>
-            <a:pPr lvl="1">
-              <a:buFont typeface="Wingdings" panose="05000000000000000000" pitchFamily="2" charset="2"/>
-              <a:buChar char="§"/>
-            </a:pPr>
-            <a:r>
-              <a:rPr lang="en-US" dirty="0" smtClean="0"/>
-              <a:t>Backend – .NET Core on Amazon Lambda</a:t>
-            </a:r>
-          </a:p>
-          <a:p>
-            <a:pPr lvl="1">
-              <a:buFont typeface="Wingdings" panose="05000000000000000000" pitchFamily="2" charset="2"/>
-              <a:buChar char="§"/>
-            </a:pPr>
-            <a:r>
-              <a:rPr lang="en-US" dirty="0" smtClean="0"/>
-              <a:t>Frontend – </a:t>
-            </a:r>
-            <a:r>
-              <a:rPr lang="en-US" dirty="0" err="1" smtClean="0"/>
-              <a:t>Reactjs</a:t>
-            </a:r>
-            <a:r>
-              <a:rPr lang="en-US" dirty="0" smtClean="0"/>
-              <a:t> on Amazon S3</a:t>
-            </a:r>
-          </a:p>
-          <a:p>
-            <a:pPr lvl="1">
-              <a:buFont typeface="Wingdings" panose="05000000000000000000" pitchFamily="2" charset="2"/>
-              <a:buChar char="§"/>
-            </a:pPr>
-            <a:r>
-              <a:rPr lang="en-US" dirty="0" smtClean="0"/>
-              <a:t>Mobile – Android native via Google Play</a:t>
-            </a:r>
-          </a:p>
-        </p:txBody>
-      </p:sp>
+      <p:pic>
+        <p:nvPicPr>
+          <p:cNvPr id="8" name="Picture 7"/>
+          <p:cNvPicPr>
+            <a:picLocks noChangeAspect="1"/>
+          </p:cNvPicPr>
+          <p:nvPr/>
+        </p:nvPicPr>
+        <p:blipFill>
+          <a:blip r:embed="rId2" cstate="print">
+            <a:extLst>
+              <a:ext uri="{28A0092B-C50C-407E-A947-70E740481C1C}">
+                <a14:useLocalDpi xmlns:a14="http://schemas.microsoft.com/office/drawing/2010/main" val="0"/>
+              </a:ext>
+            </a:extLst>
+          </a:blip>
+          <a:stretch>
+            <a:fillRect/>
+          </a:stretch>
+        </p:blipFill>
+        <p:spPr>
+          <a:xfrm>
+            <a:off x="1638246" y="3193382"/>
+            <a:ext cx="828100" cy="1002542"/>
+          </a:xfrm>
+          <a:prstGeom prst="rect">
+            <a:avLst/>
+          </a:prstGeom>
+        </p:spPr>
+      </p:pic>
+      <p:pic>
+        <p:nvPicPr>
+          <p:cNvPr id="12" name="Picture 11"/>
+          <p:cNvPicPr>
+            <a:picLocks noChangeAspect="1"/>
+          </p:cNvPicPr>
+          <p:nvPr/>
+        </p:nvPicPr>
+        <p:blipFill>
+          <a:blip r:embed="rId3" cstate="print">
+            <a:extLst>
+              <a:ext uri="{28A0092B-C50C-407E-A947-70E740481C1C}">
+                <a14:useLocalDpi xmlns:a14="http://schemas.microsoft.com/office/drawing/2010/main" val="0"/>
+              </a:ext>
+            </a:extLst>
+          </a:blip>
+          <a:stretch>
+            <a:fillRect/>
+          </a:stretch>
+        </p:blipFill>
+        <p:spPr>
+          <a:xfrm>
+            <a:off x="3668820" y="2242645"/>
+            <a:ext cx="1477142" cy="1667203"/>
+          </a:xfrm>
+          <a:prstGeom prst="rect">
+            <a:avLst/>
+          </a:prstGeom>
+        </p:spPr>
+      </p:pic>
+      <p:pic>
+        <p:nvPicPr>
+          <p:cNvPr id="13" name="Picture 12"/>
+          <p:cNvPicPr>
+            <a:picLocks noChangeAspect="1"/>
+          </p:cNvPicPr>
+          <p:nvPr/>
+        </p:nvPicPr>
+        <p:blipFill>
+          <a:blip r:embed="rId4" cstate="print">
+            <a:extLst>
+              <a:ext uri="{28A0092B-C50C-407E-A947-70E740481C1C}">
+                <a14:useLocalDpi xmlns:a14="http://schemas.microsoft.com/office/drawing/2010/main" val="0"/>
+              </a:ext>
+            </a:extLst>
+          </a:blip>
+          <a:stretch>
+            <a:fillRect/>
+          </a:stretch>
+        </p:blipFill>
+        <p:spPr>
+          <a:xfrm>
+            <a:off x="5797953" y="2113700"/>
+            <a:ext cx="1709179" cy="2069224"/>
+          </a:xfrm>
+          <a:prstGeom prst="rect">
+            <a:avLst/>
+          </a:prstGeom>
+        </p:spPr>
+      </p:pic>
+      <p:pic>
+        <p:nvPicPr>
+          <p:cNvPr id="15" name="Picture 14"/>
+          <p:cNvPicPr>
+            <a:picLocks noChangeAspect="1"/>
+          </p:cNvPicPr>
+          <p:nvPr/>
+        </p:nvPicPr>
+        <p:blipFill>
+          <a:blip r:embed="rId5" cstate="print">
+            <a:extLst>
+              <a:ext uri="{28A0092B-C50C-407E-A947-70E740481C1C}">
+                <a14:useLocalDpi xmlns:a14="http://schemas.microsoft.com/office/drawing/2010/main" val="0"/>
+              </a:ext>
+            </a:extLst>
+          </a:blip>
+          <a:stretch>
+            <a:fillRect/>
+          </a:stretch>
+        </p:blipFill>
+        <p:spPr>
+          <a:xfrm>
+            <a:off x="8471010" y="2072180"/>
+            <a:ext cx="1492797" cy="697327"/>
+          </a:xfrm>
+          <a:prstGeom prst="rect">
+            <a:avLst/>
+          </a:prstGeom>
+        </p:spPr>
+      </p:pic>
+      <p:pic>
+        <p:nvPicPr>
+          <p:cNvPr id="16" name="Picture 15"/>
+          <p:cNvPicPr>
+            <a:picLocks noChangeAspect="1"/>
+          </p:cNvPicPr>
+          <p:nvPr/>
+        </p:nvPicPr>
+        <p:blipFill>
+          <a:blip r:embed="rId6" cstate="print">
+            <a:extLst>
+              <a:ext uri="{28A0092B-C50C-407E-A947-70E740481C1C}">
+                <a14:useLocalDpi xmlns:a14="http://schemas.microsoft.com/office/drawing/2010/main" val="0"/>
+              </a:ext>
+            </a:extLst>
+          </a:blip>
+          <a:stretch>
+            <a:fillRect/>
+          </a:stretch>
+        </p:blipFill>
+        <p:spPr>
+          <a:xfrm>
+            <a:off x="8471010" y="2573672"/>
+            <a:ext cx="2056971" cy="800517"/>
+          </a:xfrm>
+          <a:prstGeom prst="rect">
+            <a:avLst/>
+          </a:prstGeom>
+        </p:spPr>
+      </p:pic>
+      <p:pic>
+        <p:nvPicPr>
+          <p:cNvPr id="17" name="Picture 16"/>
+          <p:cNvPicPr>
+            <a:picLocks noChangeAspect="1"/>
+          </p:cNvPicPr>
+          <p:nvPr/>
+        </p:nvPicPr>
+        <p:blipFill>
+          <a:blip r:embed="rId7" cstate="print">
+            <a:extLst>
+              <a:ext uri="{28A0092B-C50C-407E-A947-70E740481C1C}">
+                <a14:useLocalDpi xmlns:a14="http://schemas.microsoft.com/office/drawing/2010/main" val="0"/>
+              </a:ext>
+            </a:extLst>
+          </a:blip>
+          <a:stretch>
+            <a:fillRect/>
+          </a:stretch>
+        </p:blipFill>
+        <p:spPr>
+          <a:xfrm>
+            <a:off x="9036616" y="3193382"/>
+            <a:ext cx="927191" cy="716466"/>
+          </a:xfrm>
+          <a:prstGeom prst="rect">
+            <a:avLst/>
+          </a:prstGeom>
+        </p:spPr>
+      </p:pic>
+      <p:pic>
+        <p:nvPicPr>
+          <p:cNvPr id="18" name="Picture 17"/>
+          <p:cNvPicPr>
+            <a:picLocks noChangeAspect="1"/>
+          </p:cNvPicPr>
+          <p:nvPr/>
+        </p:nvPicPr>
+        <p:blipFill>
+          <a:blip r:embed="rId8">
+            <a:extLst>
+              <a:ext uri="{28A0092B-C50C-407E-A947-70E740481C1C}">
+                <a14:useLocalDpi xmlns:a14="http://schemas.microsoft.com/office/drawing/2010/main" val="0"/>
+              </a:ext>
+            </a:extLst>
+          </a:blip>
+          <a:stretch>
+            <a:fillRect/>
+          </a:stretch>
+        </p:blipFill>
+        <p:spPr>
+          <a:xfrm>
+            <a:off x="1456984" y="4277064"/>
+            <a:ext cx="1190625" cy="742950"/>
+          </a:xfrm>
+          <a:prstGeom prst="rect">
+            <a:avLst/>
+          </a:prstGeom>
+        </p:spPr>
+      </p:pic>
     </p:spTree>
     <p:extLst>
       <p:ext uri="{BB962C8B-B14F-4D97-AF65-F5344CB8AC3E}">

</xml_diff>

<commit_message>
complete draft of QCVOC
</commit_message>
<xml_diff>
--- a/QC Coders - Quad Cities Veterans Outreach Center.pptx
+++ b/QC Coders - Quad Cities Veterans Outreach Center.pptx
@@ -9,8 +9,8 @@
     <p:sldId id="264" r:id="rId3"/>
     <p:sldId id="265" r:id="rId4"/>
     <p:sldId id="266" r:id="rId5"/>
-    <p:sldId id="268" r:id="rId6"/>
-    <p:sldId id="267" r:id="rId7"/>
+    <p:sldId id="267" r:id="rId6"/>
+    <p:sldId id="268" r:id="rId7"/>
     <p:sldId id="263" r:id="rId8"/>
   </p:sldIdLst>
   <p:sldSz cx="12192000" cy="6858000"/>
@@ -3948,24 +3948,28 @@
               <a:buChar char="§"/>
             </a:pPr>
             <a:r>
-              <a:rPr lang="en-US" dirty="0" smtClean="0"/>
-              <a:t>Using </a:t>
-            </a:r>
-            <a:r>
-              <a:rPr lang="en-US" dirty="0" err="1" smtClean="0"/>
-              <a:t>mardi</a:t>
-            </a:r>
-            <a:r>
-              <a:rPr lang="en-US" dirty="0" smtClean="0"/>
-              <a:t> </a:t>
-            </a:r>
-            <a:r>
-              <a:rPr lang="en-US" dirty="0" err="1" smtClean="0"/>
-              <a:t>gras</a:t>
-            </a:r>
-            <a:r>
-              <a:rPr lang="en-US" dirty="0" smtClean="0"/>
-              <a:t> tokens</a:t>
+              <a:rPr lang="en-US" sz="2400" b="1" dirty="0" smtClean="0"/>
+              <a:t>The Quad Cities Veterans Outreach Center (QCVOC) serves area Veterans by providing meals and take-home food baskets, as well as a variety of other services such as haircuts.</a:t>
+            </a:r>
+          </a:p>
+          <a:p>
+            <a:pPr lvl="2">
+              <a:buFont typeface="Wingdings" panose="05000000000000000000" pitchFamily="2" charset="2"/>
+              <a:buChar char="§"/>
+            </a:pPr>
+            <a:r>
+              <a:rPr lang="en-US" sz="2000" dirty="0" smtClean="0"/>
+              <a:t>The center needs to ensure that only actual Veterans use the services they provide.</a:t>
+            </a:r>
+          </a:p>
+          <a:p>
+            <a:pPr lvl="2">
+              <a:buFont typeface="Wingdings" panose="05000000000000000000" pitchFamily="2" charset="2"/>
+              <a:buChar char="§"/>
+            </a:pPr>
+            <a:r>
+              <a:rPr lang="en-US" sz="2000" dirty="0" smtClean="0"/>
+              <a:t>The center also needs to keep track of how many Veterans they serve.</a:t>
             </a:r>
           </a:p>
           <a:p>
@@ -3974,20 +3978,30 @@
               <a:buChar char="§"/>
             </a:pPr>
             <a:r>
-              <a:rPr lang="en-US" dirty="0" smtClean="0"/>
-              <a:t>Control access, prevent fraud</a:t>
-            </a:r>
-          </a:p>
-          <a:p>
-            <a:pPr lvl="1">
+              <a:rPr lang="en-US" sz="2400" b="1" dirty="0" smtClean="0"/>
+              <a:t>Currently, the center verifies Veterans (via ID or other documentation) at the front door, then assigns plastic tokens that Veterans use in exchange for services</a:t>
+            </a:r>
+          </a:p>
+          <a:p>
+            <a:pPr lvl="2">
               <a:buFont typeface="Wingdings" panose="05000000000000000000" pitchFamily="2" charset="2"/>
               <a:buChar char="§"/>
             </a:pPr>
             <a:r>
-              <a:rPr lang="en-US" dirty="0" smtClean="0"/>
-              <a:t>Reporting and record keeping</a:t>
-            </a:r>
-            <a:endParaRPr lang="en-US" dirty="0"/>
+              <a:rPr lang="en-US" sz="2000" dirty="0" smtClean="0"/>
+              <a:t>Tokens may be lost, used inappropriately, or brought in from the outside.</a:t>
+            </a:r>
+          </a:p>
+          <a:p>
+            <a:pPr lvl="2">
+              <a:buFont typeface="Wingdings" panose="05000000000000000000" pitchFamily="2" charset="2"/>
+              <a:buChar char="§"/>
+            </a:pPr>
+            <a:r>
+              <a:rPr lang="en-US" sz="2000" dirty="0" smtClean="0"/>
+              <a:t>It is challenging to keep track of data while handling tokens.</a:t>
+            </a:r>
+            <a:endParaRPr lang="en-US" sz="2000" dirty="0"/>
           </a:p>
         </p:txBody>
       </p:sp>
@@ -4056,7 +4070,9 @@
         </p:nvSpPr>
         <p:spPr/>
         <p:txBody>
-          <a:bodyPr/>
+          <a:bodyPr>
+            <a:normAutofit lnSpcReduction="10000"/>
+          </a:bodyPr>
           <a:lstStyle/>
           <a:p>
             <a:pPr lvl="1">
@@ -4064,8 +4080,32 @@
               <a:buChar char="§"/>
             </a:pPr>
             <a:r>
-              <a:rPr lang="en-US" dirty="0" smtClean="0"/>
-              <a:t>Electronic</a:t>
+              <a:rPr lang="en-US" sz="2400" b="1" dirty="0" smtClean="0"/>
+              <a:t>Tokens are replaced </a:t>
+            </a:r>
+            <a:r>
+              <a:rPr lang="en-US" sz="2400" b="1" dirty="0" smtClean="0"/>
+              <a:t>with plastic membership cards which include a printed barcode.</a:t>
+            </a:r>
+          </a:p>
+          <a:p>
+            <a:pPr lvl="2">
+              <a:buFont typeface="Wingdings" panose="05000000000000000000" pitchFamily="2" charset="2"/>
+              <a:buChar char="§"/>
+            </a:pPr>
+            <a:r>
+              <a:rPr lang="en-US" sz="2000" dirty="0" smtClean="0"/>
+              <a:t>Veterans are assigned a membership card and must present it when checking in and when using services.</a:t>
+            </a:r>
+          </a:p>
+          <a:p>
+            <a:pPr lvl="2">
+              <a:buFont typeface="Wingdings" panose="05000000000000000000" pitchFamily="2" charset="2"/>
+              <a:buChar char="§"/>
+            </a:pPr>
+            <a:r>
+              <a:rPr lang="en-US" sz="2000" dirty="0" smtClean="0"/>
+              <a:t>When Veterans are enrolled, personal information such as address and phone number is captured, as well as a photo.</a:t>
             </a:r>
           </a:p>
           <a:p>
@@ -4074,9 +4114,34 @@
               <a:buChar char="§"/>
             </a:pPr>
             <a:r>
-              <a:rPr lang="en-US" dirty="0" smtClean="0"/>
-              <a:t>Physical cards with barcodes</a:t>
-            </a:r>
+              <a:rPr lang="en-US" sz="2400" b="1" dirty="0" smtClean="0"/>
+              <a:t>Android tablets are used at the front door, as well as areas where services are rendered, to scan membership cards and confirm appropriate use.</a:t>
+            </a:r>
+          </a:p>
+          <a:p>
+            <a:pPr lvl="2">
+              <a:buFont typeface="Wingdings" panose="05000000000000000000" pitchFamily="2" charset="2"/>
+              <a:buChar char="§"/>
+            </a:pPr>
+            <a:r>
+              <a:rPr lang="en-US" sz="2000" dirty="0" smtClean="0"/>
+              <a:t>Staff selects ‘Scanner’ functionality on the app, then selects the appropriate Event and Service.</a:t>
+            </a:r>
+          </a:p>
+          <a:p>
+            <a:pPr lvl="2">
+              <a:buFont typeface="Wingdings" panose="05000000000000000000" pitchFamily="2" charset="2"/>
+              <a:buChar char="§"/>
+            </a:pPr>
+            <a:r>
+              <a:rPr lang="en-US" sz="2000" dirty="0" smtClean="0"/>
+              <a:t>After scanning a barcode, the matching Veteran’s name and photo appear on screen along with a gree</a:t>
+            </a:r>
+            <a:r>
+              <a:rPr lang="en-US" sz="2000" dirty="0" smtClean="0"/>
+              <a:t>n/yellow/red indicator.</a:t>
+            </a:r>
+            <a:endParaRPr lang="en-US" sz="2000" dirty="0" smtClean="0"/>
           </a:p>
           <a:p>
             <a:pPr lvl="1">
@@ -4084,19 +4149,10 @@
               <a:buChar char="§"/>
             </a:pPr>
             <a:r>
-              <a:rPr lang="en-US" dirty="0" smtClean="0"/>
-              <a:t>Barcode scanning with mobile devices</a:t>
-            </a:r>
-          </a:p>
-          <a:p>
-            <a:pPr lvl="1">
-              <a:buFont typeface="Wingdings" panose="05000000000000000000" pitchFamily="2" charset="2"/>
-              <a:buChar char="§"/>
-            </a:pPr>
-            <a:r>
-              <a:rPr lang="en-US" dirty="0" smtClean="0"/>
-              <a:t>Photo capture with mobile devices</a:t>
-            </a:r>
+              <a:rPr lang="en-US" sz="2400" b="1" dirty="0" smtClean="0"/>
+              <a:t>A record of each scan is stored in a database for reporting.</a:t>
+            </a:r>
+            <a:endParaRPr lang="en-US" sz="2400" b="1" dirty="0" smtClean="0"/>
           </a:p>
         </p:txBody>
       </p:sp>
@@ -4153,216 +4209,1064 @@
           </a:p>
         </p:txBody>
       </p:sp>
+      <p:grpSp>
+        <p:nvGrpSpPr>
+          <p:cNvPr id="20" name="Group 19"/>
+          <p:cNvGrpSpPr/>
+          <p:nvPr/>
+        </p:nvGrpSpPr>
+        <p:grpSpPr>
+          <a:xfrm>
+            <a:off x="3355511" y="2186812"/>
+            <a:ext cx="1827039" cy="2108501"/>
+            <a:chOff x="3770785" y="2488084"/>
+            <a:chExt cx="1827039" cy="2108501"/>
+          </a:xfrm>
+        </p:grpSpPr>
+        <p:grpSp>
+          <p:nvGrpSpPr>
+            <p:cNvPr id="3" name="Group 2"/>
+            <p:cNvGrpSpPr/>
+            <p:nvPr/>
+          </p:nvGrpSpPr>
+          <p:grpSpPr>
+            <a:xfrm>
+              <a:off x="4177478" y="2974523"/>
+              <a:ext cx="1013654" cy="1622062"/>
+              <a:chOff x="1481673" y="3193382"/>
+              <a:chExt cx="1013654" cy="1622062"/>
+            </a:xfrm>
+          </p:grpSpPr>
+          <p:pic>
+            <p:nvPicPr>
+              <p:cNvPr id="8" name="Picture 7"/>
+              <p:cNvPicPr>
+                <a:picLocks noChangeAspect="1"/>
+              </p:cNvPicPr>
+              <p:nvPr/>
+            </p:nvPicPr>
+            <p:blipFill>
+              <a:blip r:embed="rId2" cstate="print">
+                <a:extLst>
+                  <a:ext uri="{28A0092B-C50C-407E-A947-70E740481C1C}">
+                    <a14:useLocalDpi xmlns:a14="http://schemas.microsoft.com/office/drawing/2010/main" val="0"/>
+                  </a:ext>
+                </a:extLst>
+              </a:blip>
+              <a:stretch>
+                <a:fillRect/>
+              </a:stretch>
+            </p:blipFill>
+            <p:spPr>
+              <a:xfrm>
+                <a:off x="1638246" y="3193382"/>
+                <a:ext cx="700508" cy="848072"/>
+              </a:xfrm>
+              <a:prstGeom prst="rect">
+                <a:avLst/>
+              </a:prstGeom>
+            </p:spPr>
+          </p:pic>
+          <p:pic>
+            <p:nvPicPr>
+              <p:cNvPr id="18" name="Picture 17"/>
+              <p:cNvPicPr>
+                <a:picLocks noChangeAspect="1"/>
+              </p:cNvPicPr>
+              <p:nvPr/>
+            </p:nvPicPr>
+            <p:blipFill>
+              <a:blip r:embed="rId3">
+                <a:extLst>
+                  <a:ext uri="{28A0092B-C50C-407E-A947-70E740481C1C}">
+                    <a14:useLocalDpi xmlns:a14="http://schemas.microsoft.com/office/drawing/2010/main" val="0"/>
+                  </a:ext>
+                </a:extLst>
+              </a:blip>
+              <a:stretch>
+                <a:fillRect/>
+              </a:stretch>
+            </p:blipFill>
+            <p:spPr>
+              <a:xfrm>
+                <a:off x="1481673" y="4182924"/>
+                <a:ext cx="1013654" cy="632520"/>
+              </a:xfrm>
+              <a:prstGeom prst="rect">
+                <a:avLst/>
+              </a:prstGeom>
+            </p:spPr>
+          </p:pic>
+        </p:grpSp>
+        <p:sp>
+          <p:nvSpPr>
+            <p:cNvPr id="14" name="TextBox 13"/>
+            <p:cNvSpPr txBox="1"/>
+            <p:nvPr/>
+          </p:nvSpPr>
+          <p:spPr>
+            <a:xfrm>
+              <a:off x="3770785" y="2488084"/>
+              <a:ext cx="1827039" cy="461665"/>
+            </a:xfrm>
+            <a:prstGeom prst="rect">
+              <a:avLst/>
+            </a:prstGeom>
+            <a:noFill/>
+          </p:spPr>
+          <p:txBody>
+            <a:bodyPr wrap="none" rtlCol="0">
+              <a:spAutoFit/>
+            </a:bodyPr>
+            <a:lstStyle/>
+            <a:p>
+              <a:r>
+                <a:rPr lang="en-US" sz="2400" dirty="0" smtClean="0"/>
+                <a:t>AWS Lambda</a:t>
+              </a:r>
+              <a:endParaRPr lang="en-US" sz="2400" dirty="0"/>
+            </a:p>
+          </p:txBody>
+        </p:sp>
+      </p:grpSp>
+      <p:grpSp>
+        <p:nvGrpSpPr>
+          <p:cNvPr id="11" name="Group 10"/>
+          <p:cNvGrpSpPr/>
+          <p:nvPr/>
+        </p:nvGrpSpPr>
+        <p:grpSpPr>
+          <a:xfrm>
+            <a:off x="1287624" y="2214963"/>
+            <a:ext cx="1330108" cy="2472058"/>
+            <a:chOff x="1263120" y="2487413"/>
+            <a:chExt cx="1330108" cy="2472058"/>
+          </a:xfrm>
+        </p:grpSpPr>
+        <p:pic>
+          <p:nvPicPr>
+            <p:cNvPr id="12" name="Picture 11"/>
+            <p:cNvPicPr>
+              <a:picLocks noChangeAspect="1"/>
+            </p:cNvPicPr>
+            <p:nvPr/>
+          </p:nvPicPr>
+          <p:blipFill>
+            <a:blip r:embed="rId4" cstate="print">
+              <a:extLst>
+                <a:ext uri="{28A0092B-C50C-407E-A947-70E740481C1C}">
+                  <a14:useLocalDpi xmlns:a14="http://schemas.microsoft.com/office/drawing/2010/main" val="0"/>
+                </a:ext>
+              </a:extLst>
+            </a:blip>
+            <a:stretch>
+              <a:fillRect/>
+            </a:stretch>
+          </p:blipFill>
+          <p:spPr>
+            <a:xfrm>
+              <a:off x="1565600" y="2959434"/>
+              <a:ext cx="725151" cy="818455"/>
+            </a:xfrm>
+            <a:prstGeom prst="rect">
+              <a:avLst/>
+            </a:prstGeom>
+          </p:spPr>
+        </p:pic>
+        <p:sp>
+          <p:nvSpPr>
+            <p:cNvPr id="19" name="TextBox 18"/>
+            <p:cNvSpPr txBox="1"/>
+            <p:nvPr/>
+          </p:nvSpPr>
+          <p:spPr>
+            <a:xfrm>
+              <a:off x="1263120" y="2487413"/>
+              <a:ext cx="1330108" cy="461665"/>
+            </a:xfrm>
+            <a:prstGeom prst="rect">
+              <a:avLst/>
+            </a:prstGeom>
+            <a:noFill/>
+          </p:spPr>
+          <p:txBody>
+            <a:bodyPr wrap="none" rtlCol="0">
+              <a:spAutoFit/>
+            </a:bodyPr>
+            <a:lstStyle/>
+            <a:p>
+              <a:r>
+                <a:rPr lang="en-US" sz="2400" dirty="0" smtClean="0"/>
+                <a:t>AWS RDS</a:t>
+              </a:r>
+              <a:endParaRPr lang="en-US" sz="2400" dirty="0"/>
+            </a:p>
+          </p:txBody>
+        </p:sp>
+        <p:pic>
+          <p:nvPicPr>
+            <p:cNvPr id="6" name="Picture 5"/>
+            <p:cNvPicPr>
+              <a:picLocks noChangeAspect="1"/>
+            </p:cNvPicPr>
+            <p:nvPr/>
+          </p:nvPicPr>
+          <p:blipFill>
+            <a:blip r:embed="rId5">
+              <a:extLst>
+                <a:ext uri="{28A0092B-C50C-407E-A947-70E740481C1C}">
+                  <a14:useLocalDpi xmlns:a14="http://schemas.microsoft.com/office/drawing/2010/main" val="0"/>
+                </a:ext>
+              </a:extLst>
+            </a:blip>
+            <a:stretch>
+              <a:fillRect/>
+            </a:stretch>
+          </p:blipFill>
+          <p:spPr>
+            <a:xfrm>
+              <a:off x="1370428" y="3933218"/>
+              <a:ext cx="1115492" cy="1026253"/>
+            </a:xfrm>
+            <a:prstGeom prst="rect">
+              <a:avLst/>
+            </a:prstGeom>
+          </p:spPr>
+        </p:pic>
+      </p:grpSp>
+      <p:sp>
+        <p:nvSpPr>
+          <p:cNvPr id="29" name="Left-Right Arrow 28"/>
+          <p:cNvSpPr/>
+          <p:nvPr/>
+        </p:nvSpPr>
+        <p:spPr>
+          <a:xfrm>
+            <a:off x="2781143" y="3421559"/>
+            <a:ext cx="584540" cy="240639"/>
+          </a:xfrm>
+          <a:prstGeom prst="leftRightArrow">
+            <a:avLst/>
+          </a:prstGeom>
+          <a:solidFill>
+            <a:schemeClr val="tx1"/>
+          </a:solidFill>
+          <a:ln>
+            <a:solidFill>
+              <a:schemeClr val="tx1"/>
+            </a:solidFill>
+          </a:ln>
+        </p:spPr>
+        <p:style>
+          <a:lnRef idx="2">
+            <a:schemeClr val="accent1">
+              <a:shade val="50000"/>
+            </a:schemeClr>
+          </a:lnRef>
+          <a:fillRef idx="1">
+            <a:schemeClr val="accent1"/>
+          </a:fillRef>
+          <a:effectRef idx="0">
+            <a:schemeClr val="accent1"/>
+          </a:effectRef>
+          <a:fontRef idx="minor">
+            <a:schemeClr val="lt1"/>
+          </a:fontRef>
+        </p:style>
+        <p:txBody>
+          <a:bodyPr rtlCol="0" anchor="ctr"/>
+          <a:lstStyle/>
+          <a:p>
+            <a:pPr algn="ctr"/>
+            <a:endParaRPr lang="en-US"/>
+          </a:p>
+        </p:txBody>
+      </p:sp>
+      <p:sp>
+        <p:nvSpPr>
+          <p:cNvPr id="31" name="Left-Right Arrow 30"/>
+          <p:cNvSpPr/>
+          <p:nvPr/>
+        </p:nvSpPr>
+        <p:spPr>
+          <a:xfrm>
+            <a:off x="8994120" y="3420128"/>
+            <a:ext cx="584540" cy="240639"/>
+          </a:xfrm>
+          <a:prstGeom prst="leftRightArrow">
+            <a:avLst/>
+          </a:prstGeom>
+          <a:solidFill>
+            <a:schemeClr val="tx1"/>
+          </a:solidFill>
+          <a:ln>
+            <a:solidFill>
+              <a:schemeClr val="tx1"/>
+            </a:solidFill>
+          </a:ln>
+        </p:spPr>
+        <p:style>
+          <a:lnRef idx="2">
+            <a:schemeClr val="accent1">
+              <a:shade val="50000"/>
+            </a:schemeClr>
+          </a:lnRef>
+          <a:fillRef idx="1">
+            <a:schemeClr val="accent1"/>
+          </a:fillRef>
+          <a:effectRef idx="0">
+            <a:schemeClr val="accent1"/>
+          </a:effectRef>
+          <a:fontRef idx="minor">
+            <a:schemeClr val="lt1"/>
+          </a:fontRef>
+        </p:style>
+        <p:txBody>
+          <a:bodyPr rtlCol="0" anchor="ctr"/>
+          <a:lstStyle/>
+          <a:p>
+            <a:pPr algn="ctr"/>
+            <a:endParaRPr lang="en-US"/>
+          </a:p>
+        </p:txBody>
+      </p:sp>
+      <p:grpSp>
+        <p:nvGrpSpPr>
+          <p:cNvPr id="38" name="Group 37"/>
+          <p:cNvGrpSpPr/>
+          <p:nvPr/>
+        </p:nvGrpSpPr>
+        <p:grpSpPr>
+          <a:xfrm>
+            <a:off x="9505164" y="2182488"/>
+            <a:ext cx="1650516" cy="3297758"/>
+            <a:chOff x="9505164" y="2182488"/>
+            <a:chExt cx="1650516" cy="3297758"/>
+          </a:xfrm>
+        </p:grpSpPr>
+        <p:pic>
+          <p:nvPicPr>
+            <p:cNvPr id="22" name="Picture 21"/>
+            <p:cNvPicPr>
+              <a:picLocks noChangeAspect="1"/>
+            </p:cNvPicPr>
+            <p:nvPr/>
+          </p:nvPicPr>
+          <p:blipFill>
+            <a:blip r:embed="rId6">
+              <a:extLst>
+                <a:ext uri="{28A0092B-C50C-407E-A947-70E740481C1C}">
+                  <a14:useLocalDpi xmlns:a14="http://schemas.microsoft.com/office/drawing/2010/main" val="0"/>
+                </a:ext>
+              </a:extLst>
+            </a:blip>
+            <a:stretch>
+              <a:fillRect/>
+            </a:stretch>
+          </p:blipFill>
+          <p:spPr>
+            <a:xfrm>
+              <a:off x="9701467" y="3482794"/>
+              <a:ext cx="1251908" cy="1251908"/>
+            </a:xfrm>
+            <a:prstGeom prst="rect">
+              <a:avLst/>
+            </a:prstGeom>
+          </p:spPr>
+        </p:pic>
+        <p:sp>
+          <p:nvSpPr>
+            <p:cNvPr id="24" name="TextBox 23"/>
+            <p:cNvSpPr txBox="1"/>
+            <p:nvPr/>
+          </p:nvSpPr>
+          <p:spPr>
+            <a:xfrm>
+              <a:off x="9505164" y="2182488"/>
+              <a:ext cx="1650516" cy="461665"/>
+            </a:xfrm>
+            <a:prstGeom prst="rect">
+              <a:avLst/>
+            </a:prstGeom>
+            <a:noFill/>
+          </p:spPr>
+          <p:txBody>
+            <a:bodyPr wrap="none" rtlCol="0">
+              <a:spAutoFit/>
+            </a:bodyPr>
+            <a:lstStyle/>
+            <a:p>
+              <a:r>
+                <a:rPr lang="en-US" sz="2400" dirty="0" smtClean="0"/>
+                <a:t>Google Play</a:t>
+              </a:r>
+              <a:endParaRPr lang="en-US" sz="2400" dirty="0"/>
+            </a:p>
+          </p:txBody>
+        </p:sp>
+        <p:pic>
+          <p:nvPicPr>
+            <p:cNvPr id="32" name="Picture 31"/>
+            <p:cNvPicPr>
+              <a:picLocks noChangeAspect="1"/>
+            </p:cNvPicPr>
+            <p:nvPr/>
+          </p:nvPicPr>
+          <p:blipFill>
+            <a:blip r:embed="rId7" cstate="print">
+              <a:extLst>
+                <a:ext uri="{28A0092B-C50C-407E-A947-70E740481C1C}">
+                  <a14:useLocalDpi xmlns:a14="http://schemas.microsoft.com/office/drawing/2010/main" val="0"/>
+                </a:ext>
+              </a:extLst>
+            </a:blip>
+            <a:stretch>
+              <a:fillRect/>
+            </a:stretch>
+          </p:blipFill>
+          <p:spPr>
+            <a:xfrm>
+              <a:off x="9887863" y="2603678"/>
+              <a:ext cx="879116" cy="879116"/>
+            </a:xfrm>
+            <a:prstGeom prst="rect">
+              <a:avLst/>
+            </a:prstGeom>
+          </p:spPr>
+        </p:pic>
+        <p:pic>
+          <p:nvPicPr>
+            <p:cNvPr id="37" name="Picture 36"/>
+            <p:cNvPicPr>
+              <a:picLocks noChangeAspect="1"/>
+            </p:cNvPicPr>
+            <p:nvPr/>
+          </p:nvPicPr>
+          <p:blipFill>
+            <a:blip r:embed="rId8" cstate="print">
+              <a:extLst>
+                <a:ext uri="{28A0092B-C50C-407E-A947-70E740481C1C}">
+                  <a14:useLocalDpi xmlns:a14="http://schemas.microsoft.com/office/drawing/2010/main" val="0"/>
+                </a:ext>
+              </a:extLst>
+            </a:blip>
+            <a:stretch>
+              <a:fillRect/>
+            </a:stretch>
+          </p:blipFill>
+          <p:spPr>
+            <a:xfrm>
+              <a:off x="9735894" y="4734624"/>
+              <a:ext cx="1183054" cy="745622"/>
+            </a:xfrm>
+            <a:prstGeom prst="rect">
+              <a:avLst/>
+            </a:prstGeom>
+          </p:spPr>
+        </p:pic>
+      </p:grpSp>
+      <p:grpSp>
+        <p:nvGrpSpPr>
+          <p:cNvPr id="40" name="Group 39"/>
+          <p:cNvGrpSpPr/>
+          <p:nvPr/>
+        </p:nvGrpSpPr>
+        <p:grpSpPr>
+          <a:xfrm>
+            <a:off x="7414858" y="2214963"/>
+            <a:ext cx="1492797" cy="3414234"/>
+            <a:chOff x="6711477" y="2214963"/>
+            <a:chExt cx="1492797" cy="3414234"/>
+          </a:xfrm>
+        </p:grpSpPr>
+        <p:pic>
+          <p:nvPicPr>
+            <p:cNvPr id="13" name="Picture 12"/>
+            <p:cNvPicPr>
+              <a:picLocks noChangeAspect="1"/>
+            </p:cNvPicPr>
+            <p:nvPr/>
+          </p:nvPicPr>
+          <p:blipFill>
+            <a:blip r:embed="rId9" cstate="print">
+              <a:extLst>
+                <a:ext uri="{28A0092B-C50C-407E-A947-70E740481C1C}">
+                  <a14:useLocalDpi xmlns:a14="http://schemas.microsoft.com/office/drawing/2010/main" val="0"/>
+                </a:ext>
+              </a:extLst>
+            </a:blip>
+            <a:stretch>
+              <a:fillRect/>
+            </a:stretch>
+          </p:blipFill>
+          <p:spPr>
+            <a:xfrm>
+              <a:off x="7098244" y="2647583"/>
+              <a:ext cx="719257" cy="870771"/>
+            </a:xfrm>
+            <a:prstGeom prst="rect">
+              <a:avLst/>
+            </a:prstGeom>
+          </p:spPr>
+        </p:pic>
+        <p:pic>
+          <p:nvPicPr>
+            <p:cNvPr id="15" name="Picture 14"/>
+            <p:cNvPicPr>
+              <a:picLocks noChangeAspect="1"/>
+            </p:cNvPicPr>
+            <p:nvPr/>
+          </p:nvPicPr>
+          <p:blipFill>
+            <a:blip r:embed="rId10" cstate="print">
+              <a:extLst>
+                <a:ext uri="{28A0092B-C50C-407E-A947-70E740481C1C}">
+                  <a14:useLocalDpi xmlns:a14="http://schemas.microsoft.com/office/drawing/2010/main" val="0"/>
+                </a:ext>
+              </a:extLst>
+            </a:blip>
+            <a:stretch>
+              <a:fillRect/>
+            </a:stretch>
+          </p:blipFill>
+          <p:spPr>
+            <a:xfrm>
+              <a:off x="6711477" y="3579898"/>
+              <a:ext cx="1492797" cy="697327"/>
+            </a:xfrm>
+            <a:prstGeom prst="rect">
+              <a:avLst/>
+            </a:prstGeom>
+          </p:spPr>
+        </p:pic>
+        <p:pic>
+          <p:nvPicPr>
+            <p:cNvPr id="17" name="Picture 16"/>
+            <p:cNvPicPr>
+              <a:picLocks noChangeAspect="1"/>
+            </p:cNvPicPr>
+            <p:nvPr/>
+          </p:nvPicPr>
+          <p:blipFill>
+            <a:blip r:embed="rId11" cstate="print">
+              <a:extLst>
+                <a:ext uri="{28A0092B-C50C-407E-A947-70E740481C1C}">
+                  <a14:useLocalDpi xmlns:a14="http://schemas.microsoft.com/office/drawing/2010/main" val="0"/>
+                </a:ext>
+              </a:extLst>
+            </a:blip>
+            <a:stretch>
+              <a:fillRect/>
+            </a:stretch>
+          </p:blipFill>
+          <p:spPr>
+            <a:xfrm>
+              <a:off x="6811888" y="4235453"/>
+              <a:ext cx="1291971" cy="998342"/>
+            </a:xfrm>
+            <a:prstGeom prst="rect">
+              <a:avLst/>
+            </a:prstGeom>
+          </p:spPr>
+        </p:pic>
+        <p:sp>
+          <p:nvSpPr>
+            <p:cNvPr id="5" name="TextBox 4"/>
+            <p:cNvSpPr txBox="1"/>
+            <p:nvPr/>
+          </p:nvSpPr>
+          <p:spPr>
+            <a:xfrm>
+              <a:off x="6901020" y="2214963"/>
+              <a:ext cx="1113703" cy="461665"/>
+            </a:xfrm>
+            <a:prstGeom prst="rect">
+              <a:avLst/>
+            </a:prstGeom>
+            <a:noFill/>
+          </p:spPr>
+          <p:txBody>
+            <a:bodyPr wrap="none" rtlCol="0">
+              <a:spAutoFit/>
+            </a:bodyPr>
+            <a:lstStyle/>
+            <a:p>
+              <a:r>
+                <a:rPr lang="en-US" sz="2400" dirty="0" smtClean="0"/>
+                <a:t>AWS</a:t>
+              </a:r>
+              <a:r>
+                <a:rPr lang="en-US" dirty="0" smtClean="0"/>
+                <a:t> </a:t>
+              </a:r>
+              <a:r>
+                <a:rPr lang="en-US" sz="2400" dirty="0" smtClean="0"/>
+                <a:t>S3</a:t>
+              </a:r>
+              <a:endParaRPr lang="en-US" sz="2400" dirty="0"/>
+            </a:p>
+          </p:txBody>
+        </p:sp>
+        <p:pic>
+          <p:nvPicPr>
+            <p:cNvPr id="39" name="Picture 38"/>
+            <p:cNvPicPr>
+              <a:picLocks noChangeAspect="1"/>
+            </p:cNvPicPr>
+            <p:nvPr/>
+          </p:nvPicPr>
+          <p:blipFill>
+            <a:blip r:embed="rId12" cstate="print">
+              <a:extLst>
+                <a:ext uri="{28A0092B-C50C-407E-A947-70E740481C1C}">
+                  <a14:useLocalDpi xmlns:a14="http://schemas.microsoft.com/office/drawing/2010/main" val="0"/>
+                </a:ext>
+              </a:extLst>
+            </a:blip>
+            <a:stretch>
+              <a:fillRect/>
+            </a:stretch>
+          </p:blipFill>
+          <p:spPr>
+            <a:xfrm>
+              <a:off x="6949643" y="5233795"/>
+              <a:ext cx="1016456" cy="395402"/>
+            </a:xfrm>
+            <a:prstGeom prst="rect">
+              <a:avLst/>
+            </a:prstGeom>
+          </p:spPr>
+        </p:pic>
+      </p:grpSp>
+      <p:grpSp>
+        <p:nvGrpSpPr>
+          <p:cNvPr id="43" name="Group 42"/>
+          <p:cNvGrpSpPr/>
+          <p:nvPr/>
+        </p:nvGrpSpPr>
+        <p:grpSpPr>
+          <a:xfrm>
+            <a:off x="5792950" y="2639177"/>
+            <a:ext cx="946173" cy="1280898"/>
+            <a:chOff x="6069441" y="2644153"/>
+            <a:chExt cx="946173" cy="1280898"/>
+          </a:xfrm>
+        </p:grpSpPr>
+        <p:pic>
+          <p:nvPicPr>
+            <p:cNvPr id="41" name="Picture 40"/>
+            <p:cNvPicPr>
+              <a:picLocks noChangeAspect="1"/>
+            </p:cNvPicPr>
+            <p:nvPr/>
+          </p:nvPicPr>
+          <p:blipFill>
+            <a:blip r:embed="rId13" cstate="print">
+              <a:extLst>
+                <a:ext uri="{28A0092B-C50C-407E-A947-70E740481C1C}">
+                  <a14:useLocalDpi xmlns:a14="http://schemas.microsoft.com/office/drawing/2010/main" val="0"/>
+                </a:ext>
+              </a:extLst>
+            </a:blip>
+            <a:stretch>
+              <a:fillRect/>
+            </a:stretch>
+          </p:blipFill>
+          <p:spPr>
+            <a:xfrm>
+              <a:off x="6252001" y="3234745"/>
+              <a:ext cx="570145" cy="690306"/>
+            </a:xfrm>
+            <a:prstGeom prst="rect">
+              <a:avLst/>
+            </a:prstGeom>
+          </p:spPr>
+        </p:pic>
+        <p:sp>
+          <p:nvSpPr>
+            <p:cNvPr id="42" name="TextBox 41"/>
+            <p:cNvSpPr txBox="1"/>
+            <p:nvPr/>
+          </p:nvSpPr>
+          <p:spPr>
+            <a:xfrm>
+              <a:off x="6069441" y="2644153"/>
+              <a:ext cx="946173" cy="584775"/>
+            </a:xfrm>
+            <a:prstGeom prst="rect">
+              <a:avLst/>
+            </a:prstGeom>
+            <a:noFill/>
+          </p:spPr>
+          <p:txBody>
+            <a:bodyPr wrap="square" rtlCol="0">
+              <a:spAutoFit/>
+            </a:bodyPr>
+            <a:lstStyle/>
+            <a:p>
+              <a:pPr algn="ctr"/>
+              <a:r>
+                <a:rPr lang="en-US" sz="1600" dirty="0" smtClean="0"/>
+                <a:t>AWS API Gateway</a:t>
+              </a:r>
+              <a:endParaRPr lang="en-US" sz="1600" dirty="0"/>
+            </a:p>
+          </p:txBody>
+        </p:sp>
+      </p:grpSp>
+      <p:sp>
+        <p:nvSpPr>
+          <p:cNvPr id="44" name="Left-Right Arrow 43"/>
+          <p:cNvSpPr/>
+          <p:nvPr/>
+        </p:nvSpPr>
+        <p:spPr>
+          <a:xfrm>
+            <a:off x="5151613" y="3420129"/>
+            <a:ext cx="584540" cy="240639"/>
+          </a:xfrm>
+          <a:prstGeom prst="leftRightArrow">
+            <a:avLst/>
+          </a:prstGeom>
+          <a:solidFill>
+            <a:schemeClr val="tx1"/>
+          </a:solidFill>
+          <a:ln>
+            <a:solidFill>
+              <a:schemeClr val="tx1"/>
+            </a:solidFill>
+          </a:ln>
+        </p:spPr>
+        <p:style>
+          <a:lnRef idx="2">
+            <a:schemeClr val="accent1">
+              <a:shade val="50000"/>
+            </a:schemeClr>
+          </a:lnRef>
+          <a:fillRef idx="1">
+            <a:schemeClr val="accent1"/>
+          </a:fillRef>
+          <a:effectRef idx="0">
+            <a:schemeClr val="accent1"/>
+          </a:effectRef>
+          <a:fontRef idx="minor">
+            <a:schemeClr val="lt1"/>
+          </a:fontRef>
+        </p:style>
+        <p:txBody>
+          <a:bodyPr rtlCol="0" anchor="ctr"/>
+          <a:lstStyle/>
+          <a:p>
+            <a:pPr algn="ctr"/>
+            <a:endParaRPr lang="en-US"/>
+          </a:p>
+        </p:txBody>
+      </p:sp>
+      <p:sp>
+        <p:nvSpPr>
+          <p:cNvPr id="45" name="Left-Right Arrow 44"/>
+          <p:cNvSpPr/>
+          <p:nvPr/>
+        </p:nvSpPr>
+        <p:spPr>
+          <a:xfrm>
+            <a:off x="6790626" y="3420128"/>
+            <a:ext cx="584540" cy="240639"/>
+          </a:xfrm>
+          <a:prstGeom prst="leftRightArrow">
+            <a:avLst/>
+          </a:prstGeom>
+          <a:solidFill>
+            <a:schemeClr val="tx1"/>
+          </a:solidFill>
+          <a:ln>
+            <a:solidFill>
+              <a:schemeClr val="tx1"/>
+            </a:solidFill>
+          </a:ln>
+        </p:spPr>
+        <p:style>
+          <a:lnRef idx="2">
+            <a:schemeClr val="accent1">
+              <a:shade val="50000"/>
+            </a:schemeClr>
+          </a:lnRef>
+          <a:fillRef idx="1">
+            <a:schemeClr val="accent1"/>
+          </a:fillRef>
+          <a:effectRef idx="0">
+            <a:schemeClr val="accent1"/>
+          </a:effectRef>
+          <a:fontRef idx="minor">
+            <a:schemeClr val="lt1"/>
+          </a:fontRef>
+        </p:style>
+        <p:txBody>
+          <a:bodyPr rtlCol="0" anchor="ctr"/>
+          <a:lstStyle/>
+          <a:p>
+            <a:pPr algn="ctr"/>
+            <a:endParaRPr lang="en-US"/>
+          </a:p>
+        </p:txBody>
+      </p:sp>
       <p:pic>
         <p:nvPicPr>
-          <p:cNvPr id="8" name="Picture 7"/>
+          <p:cNvPr id="2050" name="Picture 2" descr="Image result for user icon"/>
           <p:cNvPicPr>
-            <a:picLocks noChangeAspect="1"/>
+            <a:picLocks noChangeAspect="1" noChangeArrowheads="1"/>
           </p:cNvPicPr>
           <p:nvPr/>
         </p:nvPicPr>
         <p:blipFill>
-          <a:blip r:embed="rId2" cstate="print">
+          <a:blip r:embed="rId14" cstate="print">
             <a:extLst>
               <a:ext uri="{28A0092B-C50C-407E-A947-70E740481C1C}">
                 <a14:useLocalDpi xmlns:a14="http://schemas.microsoft.com/office/drawing/2010/main" val="0"/>
               </a:ext>
             </a:extLst>
           </a:blip>
+          <a:srcRect/>
           <a:stretch>
             <a:fillRect/>
           </a:stretch>
         </p:blipFill>
-        <p:spPr>
+        <p:spPr bwMode="auto">
           <a:xfrm>
-            <a:off x="1638246" y="3193382"/>
-            <a:ext cx="828100" cy="1002542"/>
+            <a:off x="8718104" y="508433"/>
+            <a:ext cx="1013654" cy="1013654"/>
           </a:xfrm>
           <a:prstGeom prst="rect">
             <a:avLst/>
           </a:prstGeom>
+          <a:noFill/>
+          <a:extLst>
+            <a:ext uri="{909E8E84-426E-40DD-AFC4-6F175D3DCCD1}">
+              <a14:hiddenFill xmlns:a14="http://schemas.microsoft.com/office/drawing/2010/main">
+                <a:solidFill>
+                  <a:srgbClr val="FFFFFF"/>
+                </a:solidFill>
+              </a14:hiddenFill>
+            </a:ext>
+          </a:extLst>
         </p:spPr>
       </p:pic>
-      <p:pic>
-        <p:nvPicPr>
-          <p:cNvPr id="12" name="Picture 11"/>
-          <p:cNvPicPr>
-            <a:picLocks noChangeAspect="1"/>
-          </p:cNvPicPr>
+      <p:sp>
+        <p:nvSpPr>
+          <p:cNvPr id="49" name="Left-Right Arrow 48"/>
+          <p:cNvSpPr/>
           <p:nvPr/>
-        </p:nvPicPr>
-        <p:blipFill>
-          <a:blip r:embed="rId3" cstate="print">
-            <a:extLst>
-              <a:ext uri="{28A0092B-C50C-407E-A947-70E740481C1C}">
-                <a14:useLocalDpi xmlns:a14="http://schemas.microsoft.com/office/drawing/2010/main" val="0"/>
-              </a:ext>
-            </a:extLst>
-          </a:blip>
-          <a:stretch>
-            <a:fillRect/>
-          </a:stretch>
-        </p:blipFill>
+        </p:nvSpPr>
+        <p:spPr>
+          <a:xfrm rot="18838851">
+            <a:off x="8115316" y="1683727"/>
+            <a:ext cx="949684" cy="240639"/>
+          </a:xfrm>
+          <a:prstGeom prst="leftRightArrow">
+            <a:avLst/>
+          </a:prstGeom>
+          <a:solidFill>
+            <a:schemeClr val="tx1"/>
+          </a:solidFill>
+          <a:ln>
+            <a:solidFill>
+              <a:schemeClr val="tx1"/>
+            </a:solidFill>
+          </a:ln>
+        </p:spPr>
+        <p:style>
+          <a:lnRef idx="2">
+            <a:schemeClr val="accent1">
+              <a:shade val="50000"/>
+            </a:schemeClr>
+          </a:lnRef>
+          <a:fillRef idx="1">
+            <a:schemeClr val="accent1"/>
+          </a:fillRef>
+          <a:effectRef idx="0">
+            <a:schemeClr val="accent1"/>
+          </a:effectRef>
+          <a:fontRef idx="minor">
+            <a:schemeClr val="lt1"/>
+          </a:fontRef>
+        </p:style>
+        <p:txBody>
+          <a:bodyPr rtlCol="0" anchor="ctr"/>
+          <a:lstStyle/>
+          <a:p>
+            <a:pPr algn="ctr"/>
+            <a:endParaRPr lang="en-US"/>
+          </a:p>
+        </p:txBody>
+      </p:sp>
+      <p:sp>
+        <p:nvSpPr>
+          <p:cNvPr id="50" name="Left-Right Arrow 49"/>
+          <p:cNvSpPr/>
+          <p:nvPr/>
+        </p:nvSpPr>
+        <p:spPr>
+          <a:xfrm rot="2554949">
+            <a:off x="9461363" y="1668384"/>
+            <a:ext cx="949684" cy="240639"/>
+          </a:xfrm>
+          <a:prstGeom prst="leftRightArrow">
+            <a:avLst/>
+          </a:prstGeom>
+          <a:solidFill>
+            <a:schemeClr val="tx1"/>
+          </a:solidFill>
+          <a:ln>
+            <a:solidFill>
+              <a:schemeClr val="tx1"/>
+            </a:solidFill>
+          </a:ln>
+        </p:spPr>
+        <p:style>
+          <a:lnRef idx="2">
+            <a:schemeClr val="accent1">
+              <a:shade val="50000"/>
+            </a:schemeClr>
+          </a:lnRef>
+          <a:fillRef idx="1">
+            <a:schemeClr val="accent1"/>
+          </a:fillRef>
+          <a:effectRef idx="0">
+            <a:schemeClr val="accent1"/>
+          </a:effectRef>
+          <a:fontRef idx="minor">
+            <a:schemeClr val="lt1"/>
+          </a:fontRef>
+        </p:style>
+        <p:txBody>
+          <a:bodyPr rtlCol="0" anchor="ctr"/>
+          <a:lstStyle/>
+          <a:p>
+            <a:pPr algn="ctr"/>
+            <a:endParaRPr lang="en-US"/>
+          </a:p>
+        </p:txBody>
+      </p:sp>
+      <p:sp>
+        <p:nvSpPr>
+          <p:cNvPr id="51" name="TextBox 50"/>
+          <p:cNvSpPr txBox="1"/>
+          <p:nvPr/>
+        </p:nvSpPr>
         <p:spPr>
           <a:xfrm>
-            <a:off x="3668820" y="2242645"/>
-            <a:ext cx="1477142" cy="1667203"/>
+            <a:off x="1185609" y="5873619"/>
+            <a:ext cx="1534138" cy="461665"/>
           </a:xfrm>
           <a:prstGeom prst="rect">
             <a:avLst/>
           </a:prstGeom>
+          <a:noFill/>
         </p:spPr>
-      </p:pic>
-      <p:pic>
-        <p:nvPicPr>
-          <p:cNvPr id="13" name="Picture 12"/>
-          <p:cNvPicPr>
-            <a:picLocks noChangeAspect="1"/>
-          </p:cNvPicPr>
+        <p:txBody>
+          <a:bodyPr wrap="none" rtlCol="0">
+            <a:spAutoFit/>
+          </a:bodyPr>
+          <a:lstStyle/>
+          <a:p>
+            <a:r>
+              <a:rPr lang="en-US" sz="2400" dirty="0" smtClean="0"/>
+              <a:t>(Database)</a:t>
+            </a:r>
+            <a:endParaRPr lang="en-US" sz="2400" dirty="0"/>
+          </a:p>
+        </p:txBody>
+      </p:sp>
+      <p:sp>
+        <p:nvSpPr>
+          <p:cNvPr id="52" name="TextBox 51"/>
+          <p:cNvSpPr txBox="1"/>
           <p:nvPr/>
-        </p:nvPicPr>
-        <p:blipFill>
-          <a:blip r:embed="rId4" cstate="print">
-            <a:extLst>
-              <a:ext uri="{28A0092B-C50C-407E-A947-70E740481C1C}">
-                <a14:useLocalDpi xmlns:a14="http://schemas.microsoft.com/office/drawing/2010/main" val="0"/>
-              </a:ext>
-            </a:extLst>
-          </a:blip>
-          <a:stretch>
-            <a:fillRect/>
-          </a:stretch>
-        </p:blipFill>
+        </p:nvSpPr>
         <p:spPr>
           <a:xfrm>
-            <a:off x="5797953" y="2113700"/>
-            <a:ext cx="1709179" cy="2069224"/>
+            <a:off x="3316846" y="5873619"/>
+            <a:ext cx="1904367" cy="461665"/>
           </a:xfrm>
           <a:prstGeom prst="rect">
             <a:avLst/>
           </a:prstGeom>
+          <a:noFill/>
         </p:spPr>
-      </p:pic>
-      <p:pic>
-        <p:nvPicPr>
-          <p:cNvPr id="15" name="Picture 14"/>
-          <p:cNvPicPr>
-            <a:picLocks noChangeAspect="1"/>
-          </p:cNvPicPr>
+        <p:txBody>
+          <a:bodyPr wrap="none" rtlCol="0">
+            <a:spAutoFit/>
+          </a:bodyPr>
+          <a:lstStyle/>
+          <a:p>
+            <a:r>
+              <a:rPr lang="en-US" sz="2400" dirty="0" smtClean="0"/>
+              <a:t>(Backend API)</a:t>
+            </a:r>
+            <a:endParaRPr lang="en-US" sz="2400" dirty="0"/>
+          </a:p>
+        </p:txBody>
+      </p:sp>
+      <p:sp>
+        <p:nvSpPr>
+          <p:cNvPr id="53" name="TextBox 52"/>
+          <p:cNvSpPr txBox="1"/>
           <p:nvPr/>
-        </p:nvPicPr>
-        <p:blipFill>
-          <a:blip r:embed="rId5" cstate="print">
-            <a:extLst>
-              <a:ext uri="{28A0092B-C50C-407E-A947-70E740481C1C}">
-                <a14:useLocalDpi xmlns:a14="http://schemas.microsoft.com/office/drawing/2010/main" val="0"/>
-              </a:ext>
-            </a:extLst>
-          </a:blip>
-          <a:stretch>
-            <a:fillRect/>
-          </a:stretch>
-        </p:blipFill>
+        </p:nvSpPr>
         <p:spPr>
           <a:xfrm>
-            <a:off x="8471010" y="2072180"/>
-            <a:ext cx="1492797" cy="697327"/>
+            <a:off x="7401300" y="5873618"/>
+            <a:ext cx="1519903" cy="461665"/>
           </a:xfrm>
           <a:prstGeom prst="rect">
             <a:avLst/>
           </a:prstGeom>
+          <a:noFill/>
         </p:spPr>
-      </p:pic>
-      <p:pic>
-        <p:nvPicPr>
-          <p:cNvPr id="16" name="Picture 15"/>
-          <p:cNvPicPr>
-            <a:picLocks noChangeAspect="1"/>
-          </p:cNvPicPr>
+        <p:txBody>
+          <a:bodyPr wrap="none" rtlCol="0">
+            <a:spAutoFit/>
+          </a:bodyPr>
+          <a:lstStyle/>
+          <a:p>
+            <a:r>
+              <a:rPr lang="en-US" sz="2400" dirty="0" smtClean="0"/>
+              <a:t>(Web App)</a:t>
+            </a:r>
+            <a:endParaRPr lang="en-US" sz="2400" dirty="0"/>
+          </a:p>
+        </p:txBody>
+      </p:sp>
+      <p:sp>
+        <p:nvSpPr>
+          <p:cNvPr id="54" name="TextBox 53"/>
+          <p:cNvSpPr txBox="1"/>
           <p:nvPr/>
-        </p:nvPicPr>
-        <p:blipFill>
-          <a:blip r:embed="rId6" cstate="print">
-            <a:extLst>
-              <a:ext uri="{28A0092B-C50C-407E-A947-70E740481C1C}">
-                <a14:useLocalDpi xmlns:a14="http://schemas.microsoft.com/office/drawing/2010/main" val="0"/>
-              </a:ext>
-            </a:extLst>
-          </a:blip>
-          <a:stretch>
-            <a:fillRect/>
-          </a:stretch>
-        </p:blipFill>
+        </p:nvSpPr>
         <p:spPr>
           <a:xfrm>
-            <a:off x="8471010" y="2573672"/>
-            <a:ext cx="2056971" cy="800517"/>
+            <a:off x="9415953" y="5873617"/>
+            <a:ext cx="1822935" cy="461665"/>
           </a:xfrm>
           <a:prstGeom prst="rect">
             <a:avLst/>
           </a:prstGeom>
+          <a:noFill/>
         </p:spPr>
-      </p:pic>
-      <p:pic>
-        <p:nvPicPr>
-          <p:cNvPr id="17" name="Picture 16"/>
-          <p:cNvPicPr>
-            <a:picLocks noChangeAspect="1"/>
-          </p:cNvPicPr>
-          <p:nvPr/>
-        </p:nvPicPr>
-        <p:blipFill>
-          <a:blip r:embed="rId7" cstate="print">
-            <a:extLst>
-              <a:ext uri="{28A0092B-C50C-407E-A947-70E740481C1C}">
-                <a14:useLocalDpi xmlns:a14="http://schemas.microsoft.com/office/drawing/2010/main" val="0"/>
-              </a:ext>
-            </a:extLst>
-          </a:blip>
-          <a:stretch>
-            <a:fillRect/>
-          </a:stretch>
-        </p:blipFill>
-        <p:spPr>
-          <a:xfrm>
-            <a:off x="9036616" y="3193382"/>
-            <a:ext cx="927191" cy="716466"/>
-          </a:xfrm>
-          <a:prstGeom prst="rect">
-            <a:avLst/>
-          </a:prstGeom>
-        </p:spPr>
-      </p:pic>
-      <p:pic>
-        <p:nvPicPr>
-          <p:cNvPr id="18" name="Picture 17"/>
-          <p:cNvPicPr>
-            <a:picLocks noChangeAspect="1"/>
-          </p:cNvPicPr>
-          <p:nvPr/>
-        </p:nvPicPr>
-        <p:blipFill>
-          <a:blip r:embed="rId8">
-            <a:extLst>
-              <a:ext uri="{28A0092B-C50C-407E-A947-70E740481C1C}">
-                <a14:useLocalDpi xmlns:a14="http://schemas.microsoft.com/office/drawing/2010/main" val="0"/>
-              </a:ext>
-            </a:extLst>
-          </a:blip>
-          <a:stretch>
-            <a:fillRect/>
-          </a:stretch>
-        </p:blipFill>
-        <p:spPr>
-          <a:xfrm>
-            <a:off x="1456984" y="4277064"/>
-            <a:ext cx="1190625" cy="742950"/>
-          </a:xfrm>
-          <a:prstGeom prst="rect">
-            <a:avLst/>
-          </a:prstGeom>
-        </p:spPr>
-      </p:pic>
+        <p:txBody>
+          <a:bodyPr wrap="none" rtlCol="0">
+            <a:spAutoFit/>
+          </a:bodyPr>
+          <a:lstStyle/>
+          <a:p>
+            <a:r>
+              <a:rPr lang="en-US" sz="2400" dirty="0" smtClean="0"/>
+              <a:t>(Mobile App)</a:t>
+            </a:r>
+            <a:endParaRPr lang="en-US" sz="2400" dirty="0"/>
+          </a:p>
+        </p:txBody>
+      </p:sp>
     </p:spTree>
     <p:extLst>
       <p:ext uri="{BB962C8B-B14F-4D97-AF65-F5344CB8AC3E}">
@@ -4410,72 +5314,850 @@
           <a:p>
             <a:r>
               <a:rPr lang="en-US" dirty="0" smtClean="0"/>
-              <a:t>Workflow and Pipeline</a:t>
+              <a:t>Build and Release Pipeline</a:t>
             </a:r>
             <a:endParaRPr lang="en-US" dirty="0"/>
           </a:p>
         </p:txBody>
       </p:sp>
-      <p:sp>
-        <p:nvSpPr>
-          <p:cNvPr id="3" name="Content Placeholder 2"/>
-          <p:cNvSpPr>
-            <a:spLocks noGrp="1"/>
-          </p:cNvSpPr>
-          <p:nvPr>
-            <p:ph idx="1"/>
-          </p:nvPr>
-        </p:nvSpPr>
-        <p:spPr/>
-        <p:txBody>
-          <a:bodyPr/>
-          <a:lstStyle/>
-          <a:p>
-            <a:pPr lvl="1">
-              <a:buFont typeface="Wingdings" panose="05000000000000000000" pitchFamily="2" charset="2"/>
-              <a:buChar char="§"/>
-            </a:pPr>
-            <a:r>
-              <a:rPr lang="en-US" dirty="0" smtClean="0"/>
-              <a:t>GitHub</a:t>
-            </a:r>
-          </a:p>
-          <a:p>
-            <a:pPr lvl="2">
-              <a:buFont typeface="Wingdings" panose="05000000000000000000" pitchFamily="2" charset="2"/>
-              <a:buChar char="§"/>
-            </a:pPr>
-            <a:r>
-              <a:rPr lang="en-US" dirty="0" smtClean="0"/>
-              <a:t>Issues</a:t>
-            </a:r>
-          </a:p>
-          <a:p>
-            <a:pPr lvl="2">
-              <a:buFont typeface="Wingdings" panose="05000000000000000000" pitchFamily="2" charset="2"/>
-              <a:buChar char="§"/>
-            </a:pPr>
-            <a:r>
-              <a:rPr lang="en-US" dirty="0" smtClean="0"/>
-              <a:t>Projects</a:t>
-            </a:r>
-          </a:p>
-          <a:p>
-            <a:pPr lvl="2">
-              <a:buFont typeface="Wingdings" panose="05000000000000000000" pitchFamily="2" charset="2"/>
-              <a:buChar char="§"/>
-            </a:pPr>
-            <a:r>
-              <a:rPr lang="en-US" dirty="0" smtClean="0"/>
-              <a:t>Milestones</a:t>
-            </a:r>
+      <p:grpSp>
+        <p:nvGrpSpPr>
+          <p:cNvPr id="15" name="Group 14"/>
+          <p:cNvGrpSpPr/>
+          <p:nvPr/>
+        </p:nvGrpSpPr>
+        <p:grpSpPr>
+          <a:xfrm>
+            <a:off x="1825699" y="3223735"/>
+            <a:ext cx="909636" cy="1371301"/>
+            <a:chOff x="1108683" y="2214963"/>
+            <a:chExt cx="909636" cy="1371301"/>
+          </a:xfrm>
+        </p:grpSpPr>
+        <p:pic>
+          <p:nvPicPr>
+            <p:cNvPr id="4" name="Picture 3"/>
+            <p:cNvPicPr>
+              <a:picLocks noChangeAspect="1"/>
+            </p:cNvPicPr>
+            <p:nvPr/>
+          </p:nvPicPr>
+          <p:blipFill>
+            <a:blip r:embed="rId2" cstate="print">
+              <a:extLst>
+                <a:ext uri="{28A0092B-C50C-407E-A947-70E740481C1C}">
+                  <a14:useLocalDpi xmlns:a14="http://schemas.microsoft.com/office/drawing/2010/main" val="0"/>
+                </a:ext>
+              </a:extLst>
+            </a:blip>
+            <a:stretch>
+              <a:fillRect/>
+            </a:stretch>
+          </p:blipFill>
+          <p:spPr>
+            <a:xfrm>
+              <a:off x="1108683" y="2676628"/>
+              <a:ext cx="909636" cy="909636"/>
+            </a:xfrm>
+            <a:prstGeom prst="rect">
+              <a:avLst/>
+            </a:prstGeom>
+          </p:spPr>
+        </p:pic>
+        <p:sp>
+          <p:nvSpPr>
+            <p:cNvPr id="5" name="TextBox 4"/>
+            <p:cNvSpPr txBox="1"/>
+            <p:nvPr/>
+          </p:nvSpPr>
+          <p:spPr>
+            <a:xfrm>
+              <a:off x="1287624" y="2214963"/>
+              <a:ext cx="551754" cy="461665"/>
+            </a:xfrm>
+            <a:prstGeom prst="rect">
+              <a:avLst/>
+            </a:prstGeom>
+            <a:noFill/>
+          </p:spPr>
+          <p:txBody>
+            <a:bodyPr wrap="none" rtlCol="0">
+              <a:spAutoFit/>
+            </a:bodyPr>
+            <a:lstStyle/>
+            <a:p>
+              <a:r>
+                <a:rPr lang="en-US" sz="2400" dirty="0" err="1" smtClean="0"/>
+                <a:t>Git</a:t>
+              </a:r>
+              <a:endParaRPr lang="en-US" sz="2400" dirty="0"/>
+            </a:p>
+          </p:txBody>
+        </p:sp>
+      </p:grpSp>
+      <p:grpSp>
+        <p:nvGrpSpPr>
+          <p:cNvPr id="16" name="Group 15"/>
+          <p:cNvGrpSpPr/>
+          <p:nvPr/>
+        </p:nvGrpSpPr>
+        <p:grpSpPr>
+          <a:xfrm>
+            <a:off x="3554335" y="3216866"/>
+            <a:ext cx="1067921" cy="1338035"/>
+            <a:chOff x="3028091" y="2214962"/>
+            <a:chExt cx="1067921" cy="1338035"/>
+          </a:xfrm>
+        </p:grpSpPr>
+        <p:sp>
+          <p:nvSpPr>
+            <p:cNvPr id="6" name="TextBox 5"/>
+            <p:cNvSpPr txBox="1"/>
+            <p:nvPr/>
+          </p:nvSpPr>
+          <p:spPr>
+            <a:xfrm>
+              <a:off x="3028091" y="2214962"/>
+              <a:ext cx="1067921" cy="461665"/>
+            </a:xfrm>
+            <a:prstGeom prst="rect">
+              <a:avLst/>
+            </a:prstGeom>
+            <a:noFill/>
+          </p:spPr>
+          <p:txBody>
+            <a:bodyPr wrap="none" rtlCol="0">
+              <a:spAutoFit/>
+            </a:bodyPr>
+            <a:lstStyle/>
+            <a:p>
+              <a:r>
+                <a:rPr lang="en-US" sz="2400" dirty="0" smtClean="0"/>
+                <a:t>GitHub</a:t>
+              </a:r>
+              <a:endParaRPr lang="en-US" sz="2400" dirty="0"/>
+            </a:p>
+          </p:txBody>
+        </p:sp>
+        <p:pic>
+          <p:nvPicPr>
+            <p:cNvPr id="10" name="Picture 9"/>
+            <p:cNvPicPr>
+              <a:picLocks noChangeAspect="1"/>
+            </p:cNvPicPr>
+            <p:nvPr/>
+          </p:nvPicPr>
+          <p:blipFill>
+            <a:blip r:embed="rId3" cstate="print">
+              <a:extLst>
+                <a:ext uri="{28A0092B-C50C-407E-A947-70E740481C1C}">
+                  <a14:useLocalDpi xmlns:a14="http://schemas.microsoft.com/office/drawing/2010/main" val="0"/>
+                </a:ext>
+              </a:extLst>
+            </a:blip>
+            <a:stretch>
+              <a:fillRect/>
+            </a:stretch>
+          </p:blipFill>
+          <p:spPr>
+            <a:xfrm>
+              <a:off x="3123866" y="2676627"/>
+              <a:ext cx="876370" cy="876370"/>
+            </a:xfrm>
+            <a:prstGeom prst="rect">
+              <a:avLst/>
+            </a:prstGeom>
+          </p:spPr>
+        </p:pic>
+      </p:grpSp>
+      <p:grpSp>
+        <p:nvGrpSpPr>
+          <p:cNvPr id="17" name="Group 16"/>
+          <p:cNvGrpSpPr/>
+          <p:nvPr/>
+        </p:nvGrpSpPr>
+        <p:grpSpPr>
+          <a:xfrm>
+            <a:off x="5311950" y="3183408"/>
+            <a:ext cx="1199303" cy="1407413"/>
+            <a:chOff x="4023904" y="2202396"/>
+            <a:chExt cx="1199303" cy="1407413"/>
+          </a:xfrm>
+        </p:grpSpPr>
+        <p:sp>
+          <p:nvSpPr>
+            <p:cNvPr id="7" name="TextBox 6"/>
+            <p:cNvSpPr txBox="1"/>
+            <p:nvPr/>
+          </p:nvSpPr>
+          <p:spPr>
+            <a:xfrm>
+              <a:off x="4023904" y="2202396"/>
+              <a:ext cx="1199303" cy="461665"/>
+            </a:xfrm>
+            <a:prstGeom prst="rect">
+              <a:avLst/>
+            </a:prstGeom>
+            <a:noFill/>
+          </p:spPr>
+          <p:txBody>
+            <a:bodyPr wrap="none" rtlCol="0">
+              <a:spAutoFit/>
+            </a:bodyPr>
+            <a:lstStyle/>
+            <a:p>
+              <a:r>
+                <a:rPr lang="en-US" sz="2400" dirty="0" smtClean="0"/>
+                <a:t>Travis CI</a:t>
+              </a:r>
+              <a:endParaRPr lang="en-US" sz="2400" dirty="0"/>
+            </a:p>
+          </p:txBody>
+        </p:sp>
+        <p:pic>
+          <p:nvPicPr>
+            <p:cNvPr id="11" name="Picture 10"/>
+            <p:cNvPicPr>
+              <a:picLocks noChangeAspect="1"/>
+            </p:cNvPicPr>
+            <p:nvPr/>
+          </p:nvPicPr>
+          <p:blipFill>
+            <a:blip r:embed="rId4" cstate="print">
+              <a:extLst>
+                <a:ext uri="{28A0092B-C50C-407E-A947-70E740481C1C}">
+                  <a14:useLocalDpi xmlns:a14="http://schemas.microsoft.com/office/drawing/2010/main" val="0"/>
+                </a:ext>
+              </a:extLst>
+            </a:blip>
+            <a:stretch>
+              <a:fillRect/>
+            </a:stretch>
+          </p:blipFill>
+          <p:spPr>
+            <a:xfrm>
+              <a:off x="4153209" y="2676628"/>
+              <a:ext cx="940691" cy="933181"/>
+            </a:xfrm>
+            <a:prstGeom prst="rect">
+              <a:avLst/>
+            </a:prstGeom>
+          </p:spPr>
+        </p:pic>
+      </p:grpSp>
+      <p:grpSp>
+        <p:nvGrpSpPr>
+          <p:cNvPr id="28" name="Group 27"/>
+          <p:cNvGrpSpPr/>
+          <p:nvPr/>
+        </p:nvGrpSpPr>
+        <p:grpSpPr>
+          <a:xfrm>
+            <a:off x="7495295" y="2367672"/>
+            <a:ext cx="2406658" cy="870771"/>
+            <a:chOff x="5993312" y="2318707"/>
+            <a:chExt cx="2406658" cy="870771"/>
+          </a:xfrm>
+        </p:grpSpPr>
+        <p:pic>
+          <p:nvPicPr>
+            <p:cNvPr id="14" name="Picture 13"/>
+            <p:cNvPicPr>
+              <a:picLocks noChangeAspect="1"/>
+            </p:cNvPicPr>
+            <p:nvPr/>
+          </p:nvPicPr>
+          <p:blipFill>
+            <a:blip r:embed="rId5" cstate="print">
+              <a:extLst>
+                <a:ext uri="{28A0092B-C50C-407E-A947-70E740481C1C}">
+                  <a14:useLocalDpi xmlns:a14="http://schemas.microsoft.com/office/drawing/2010/main" val="0"/>
+                </a:ext>
+              </a:extLst>
+            </a:blip>
+            <a:stretch>
+              <a:fillRect/>
+            </a:stretch>
+          </p:blipFill>
+          <p:spPr>
+            <a:xfrm>
+              <a:off x="5993312" y="2609019"/>
+              <a:ext cx="1016456" cy="395402"/>
+            </a:xfrm>
+            <a:prstGeom prst="rect">
+              <a:avLst/>
+            </a:prstGeom>
+          </p:spPr>
+        </p:pic>
+        <p:pic>
+          <p:nvPicPr>
+            <p:cNvPr id="19" name="Picture 18"/>
+            <p:cNvPicPr>
+              <a:picLocks noChangeAspect="1"/>
+            </p:cNvPicPr>
+            <p:nvPr/>
+          </p:nvPicPr>
+          <p:blipFill>
+            <a:blip r:embed="rId6" cstate="print">
+              <a:extLst>
+                <a:ext uri="{28A0092B-C50C-407E-A947-70E740481C1C}">
+                  <a14:useLocalDpi xmlns:a14="http://schemas.microsoft.com/office/drawing/2010/main" val="0"/>
+                </a:ext>
+              </a:extLst>
+            </a:blip>
+            <a:stretch>
+              <a:fillRect/>
+            </a:stretch>
+          </p:blipFill>
+          <p:spPr>
+            <a:xfrm>
+              <a:off x="7680713" y="2318707"/>
+              <a:ext cx="719257" cy="870771"/>
+            </a:xfrm>
+            <a:prstGeom prst="rect">
+              <a:avLst/>
+            </a:prstGeom>
+          </p:spPr>
+        </p:pic>
+        <p:sp>
+          <p:nvSpPr>
+            <p:cNvPr id="22" name="Right Arrow 21"/>
+            <p:cNvSpPr/>
+            <p:nvPr/>
+          </p:nvSpPr>
+          <p:spPr>
+            <a:xfrm>
+              <a:off x="7237887" y="2609019"/>
+              <a:ext cx="351692" cy="290146"/>
+            </a:xfrm>
+            <a:prstGeom prst="rightArrow">
+              <a:avLst/>
+            </a:prstGeom>
+            <a:solidFill>
+              <a:schemeClr val="tx1"/>
+            </a:solidFill>
+            <a:ln>
+              <a:solidFill>
+                <a:schemeClr val="tx1"/>
+              </a:solidFill>
+            </a:ln>
+          </p:spPr>
+          <p:style>
+            <a:lnRef idx="2">
+              <a:schemeClr val="accent1">
+                <a:shade val="50000"/>
+              </a:schemeClr>
+            </a:lnRef>
+            <a:fillRef idx="1">
+              <a:schemeClr val="accent1"/>
+            </a:fillRef>
+            <a:effectRef idx="0">
+              <a:schemeClr val="accent1"/>
+            </a:effectRef>
+            <a:fontRef idx="minor">
+              <a:schemeClr val="lt1"/>
+            </a:fontRef>
+          </p:style>
+          <p:txBody>
+            <a:bodyPr rtlCol="0" anchor="ctr"/>
+            <a:lstStyle/>
+            <a:p>
+              <a:pPr algn="ctr"/>
+              <a:endParaRPr lang="en-US"/>
+            </a:p>
+          </p:txBody>
+        </p:sp>
+      </p:grpSp>
+      <p:grpSp>
+        <p:nvGrpSpPr>
+          <p:cNvPr id="27" name="Group 26"/>
+          <p:cNvGrpSpPr/>
+          <p:nvPr/>
+        </p:nvGrpSpPr>
+        <p:grpSpPr>
+          <a:xfrm>
+            <a:off x="7476089" y="3692121"/>
+            <a:ext cx="2403856" cy="848072"/>
+            <a:chOff x="5996114" y="3706829"/>
+            <a:chExt cx="2403856" cy="848072"/>
+          </a:xfrm>
+        </p:grpSpPr>
+        <p:pic>
+          <p:nvPicPr>
+            <p:cNvPr id="12" name="Picture 11"/>
+            <p:cNvPicPr>
+              <a:picLocks noChangeAspect="1"/>
+            </p:cNvPicPr>
+            <p:nvPr/>
+          </p:nvPicPr>
+          <p:blipFill>
+            <a:blip r:embed="rId7">
+              <a:extLst>
+                <a:ext uri="{28A0092B-C50C-407E-A947-70E740481C1C}">
+                  <a14:useLocalDpi xmlns:a14="http://schemas.microsoft.com/office/drawing/2010/main" val="0"/>
+                </a:ext>
+              </a:extLst>
+            </a:blip>
+            <a:stretch>
+              <a:fillRect/>
+            </a:stretch>
+          </p:blipFill>
+          <p:spPr>
+            <a:xfrm>
+              <a:off x="5996114" y="3800456"/>
+              <a:ext cx="1013654" cy="632520"/>
+            </a:xfrm>
+            <a:prstGeom prst="rect">
+              <a:avLst/>
+            </a:prstGeom>
+          </p:spPr>
+        </p:pic>
+        <p:pic>
+          <p:nvPicPr>
+            <p:cNvPr id="18" name="Picture 17"/>
+            <p:cNvPicPr>
+              <a:picLocks noChangeAspect="1"/>
+            </p:cNvPicPr>
+            <p:nvPr/>
+          </p:nvPicPr>
+          <p:blipFill>
+            <a:blip r:embed="rId8" cstate="print">
+              <a:extLst>
+                <a:ext uri="{28A0092B-C50C-407E-A947-70E740481C1C}">
+                  <a14:useLocalDpi xmlns:a14="http://schemas.microsoft.com/office/drawing/2010/main" val="0"/>
+                </a:ext>
+              </a:extLst>
+            </a:blip>
+            <a:stretch>
+              <a:fillRect/>
+            </a:stretch>
+          </p:blipFill>
+          <p:spPr>
+            <a:xfrm>
+              <a:off x="7699462" y="3706829"/>
+              <a:ext cx="700508" cy="848072"/>
+            </a:xfrm>
+            <a:prstGeom prst="rect">
+              <a:avLst/>
+            </a:prstGeom>
+          </p:spPr>
+        </p:pic>
+        <p:sp>
+          <p:nvSpPr>
+            <p:cNvPr id="23" name="Right Arrow 22"/>
+            <p:cNvSpPr/>
+            <p:nvPr/>
+          </p:nvSpPr>
+          <p:spPr>
+            <a:xfrm>
+              <a:off x="7237887" y="3971643"/>
+              <a:ext cx="351692" cy="290146"/>
+            </a:xfrm>
+            <a:prstGeom prst="rightArrow">
+              <a:avLst/>
+            </a:prstGeom>
+            <a:solidFill>
+              <a:schemeClr val="tx1"/>
+            </a:solidFill>
+            <a:ln>
+              <a:solidFill>
+                <a:schemeClr val="tx1"/>
+              </a:solidFill>
+            </a:ln>
+          </p:spPr>
+          <p:style>
+            <a:lnRef idx="2">
+              <a:schemeClr val="accent1">
+                <a:shade val="50000"/>
+              </a:schemeClr>
+            </a:lnRef>
+            <a:fillRef idx="1">
+              <a:schemeClr val="accent1"/>
+            </a:fillRef>
+            <a:effectRef idx="0">
+              <a:schemeClr val="accent1"/>
+            </a:effectRef>
+            <a:fontRef idx="minor">
+              <a:schemeClr val="lt1"/>
+            </a:fontRef>
+          </p:style>
+          <p:txBody>
+            <a:bodyPr rtlCol="0" anchor="ctr"/>
+            <a:lstStyle/>
+            <a:p>
+              <a:pPr algn="ctr"/>
+              <a:endParaRPr lang="en-US"/>
+            </a:p>
+          </p:txBody>
+        </p:sp>
+      </p:grpSp>
+      <p:grpSp>
+        <p:nvGrpSpPr>
+          <p:cNvPr id="26" name="Group 25"/>
+          <p:cNvGrpSpPr/>
+          <p:nvPr/>
+        </p:nvGrpSpPr>
+        <p:grpSpPr>
+          <a:xfrm>
+            <a:off x="7358720" y="4814307"/>
+            <a:ext cx="2639156" cy="879116"/>
+            <a:chOff x="5859129" y="4863067"/>
+            <a:chExt cx="2639156" cy="879116"/>
+          </a:xfrm>
+        </p:grpSpPr>
+        <p:pic>
+          <p:nvPicPr>
+            <p:cNvPr id="20" name="Picture 19"/>
+            <p:cNvPicPr>
+              <a:picLocks noChangeAspect="1"/>
+            </p:cNvPicPr>
+            <p:nvPr/>
+          </p:nvPicPr>
+          <p:blipFill>
+            <a:blip r:embed="rId9" cstate="print">
+              <a:extLst>
+                <a:ext uri="{28A0092B-C50C-407E-A947-70E740481C1C}">
+                  <a14:useLocalDpi xmlns:a14="http://schemas.microsoft.com/office/drawing/2010/main" val="0"/>
+                </a:ext>
+              </a:extLst>
+            </a:blip>
+            <a:stretch>
+              <a:fillRect/>
+            </a:stretch>
+          </p:blipFill>
+          <p:spPr>
+            <a:xfrm>
+              <a:off x="7619169" y="4863067"/>
+              <a:ext cx="879116" cy="879116"/>
+            </a:xfrm>
+            <a:prstGeom prst="rect">
+              <a:avLst/>
+            </a:prstGeom>
+          </p:spPr>
+        </p:pic>
+        <p:pic>
+          <p:nvPicPr>
+            <p:cNvPr id="21" name="Picture 20"/>
+            <p:cNvPicPr>
+              <a:picLocks noChangeAspect="1"/>
+            </p:cNvPicPr>
+            <p:nvPr/>
+          </p:nvPicPr>
+          <p:blipFill>
+            <a:blip r:embed="rId10" cstate="print">
+              <a:extLst>
+                <a:ext uri="{28A0092B-C50C-407E-A947-70E740481C1C}">
+                  <a14:useLocalDpi xmlns:a14="http://schemas.microsoft.com/office/drawing/2010/main" val="0"/>
+                </a:ext>
+              </a:extLst>
+            </a:blip>
+            <a:stretch>
+              <a:fillRect/>
+            </a:stretch>
+          </p:blipFill>
+          <p:spPr>
+            <a:xfrm>
+              <a:off x="5859129" y="4925417"/>
+              <a:ext cx="1183054" cy="745622"/>
+            </a:xfrm>
+            <a:prstGeom prst="rect">
+              <a:avLst/>
+            </a:prstGeom>
+          </p:spPr>
+        </p:pic>
+        <p:sp>
+          <p:nvSpPr>
+            <p:cNvPr id="24" name="Right Arrow 23"/>
+            <p:cNvSpPr/>
+            <p:nvPr/>
+          </p:nvSpPr>
+          <p:spPr>
+            <a:xfrm>
+              <a:off x="7237887" y="5189194"/>
+              <a:ext cx="351692" cy="290146"/>
+            </a:xfrm>
+            <a:prstGeom prst="rightArrow">
+              <a:avLst/>
+            </a:prstGeom>
+            <a:solidFill>
+              <a:schemeClr val="tx1"/>
+            </a:solidFill>
+            <a:ln>
+              <a:solidFill>
+                <a:schemeClr val="tx1"/>
+              </a:solidFill>
+            </a:ln>
+          </p:spPr>
+          <p:style>
+            <a:lnRef idx="2">
+              <a:schemeClr val="accent1">
+                <a:shade val="50000"/>
+              </a:schemeClr>
+            </a:lnRef>
+            <a:fillRef idx="1">
+              <a:schemeClr val="accent1"/>
+            </a:fillRef>
+            <a:effectRef idx="0">
+              <a:schemeClr val="accent1"/>
+            </a:effectRef>
+            <a:fontRef idx="minor">
+              <a:schemeClr val="lt1"/>
+            </a:fontRef>
+          </p:style>
+          <p:txBody>
+            <a:bodyPr rtlCol="0" anchor="ctr"/>
+            <a:lstStyle/>
+            <a:p>
+              <a:pPr algn="ctr"/>
+              <a:endParaRPr lang="en-US"/>
+            </a:p>
+          </p:txBody>
+        </p:sp>
+      </p:grpSp>
+      <p:sp>
+        <p:nvSpPr>
+          <p:cNvPr id="29" name="Right Arrow 28"/>
+          <p:cNvSpPr/>
+          <p:nvPr/>
+        </p:nvSpPr>
+        <p:spPr>
+          <a:xfrm>
+            <a:off x="3016877" y="3985792"/>
+            <a:ext cx="351692" cy="290146"/>
+          </a:xfrm>
+          <a:prstGeom prst="rightArrow">
+            <a:avLst/>
+          </a:prstGeom>
+          <a:solidFill>
+            <a:schemeClr val="tx1"/>
+          </a:solidFill>
+          <a:ln>
+            <a:solidFill>
+              <a:schemeClr val="tx1"/>
+            </a:solidFill>
+          </a:ln>
+        </p:spPr>
+        <p:style>
+          <a:lnRef idx="2">
+            <a:schemeClr val="accent1">
+              <a:shade val="50000"/>
+            </a:schemeClr>
+          </a:lnRef>
+          <a:fillRef idx="1">
+            <a:schemeClr val="accent1"/>
+          </a:fillRef>
+          <a:effectRef idx="0">
+            <a:schemeClr val="accent1"/>
+          </a:effectRef>
+          <a:fontRef idx="minor">
+            <a:schemeClr val="lt1"/>
+          </a:fontRef>
+        </p:style>
+        <p:txBody>
+          <a:bodyPr rtlCol="0" anchor="ctr"/>
+          <a:lstStyle/>
+          <a:p>
+            <a:pPr algn="ctr"/>
+            <a:endParaRPr lang="en-US"/>
+          </a:p>
+        </p:txBody>
+      </p:sp>
+      <p:sp>
+        <p:nvSpPr>
+          <p:cNvPr id="30" name="Right Arrow 29"/>
+          <p:cNvSpPr/>
+          <p:nvPr/>
+        </p:nvSpPr>
+        <p:spPr>
+          <a:xfrm>
+            <a:off x="4858776" y="3985792"/>
+            <a:ext cx="351692" cy="290146"/>
+          </a:xfrm>
+          <a:prstGeom prst="rightArrow">
+            <a:avLst/>
+          </a:prstGeom>
+          <a:solidFill>
+            <a:schemeClr val="tx1"/>
+          </a:solidFill>
+          <a:ln>
+            <a:solidFill>
+              <a:schemeClr val="tx1"/>
+            </a:solidFill>
+          </a:ln>
+        </p:spPr>
+        <p:style>
+          <a:lnRef idx="2">
+            <a:schemeClr val="accent1">
+              <a:shade val="50000"/>
+            </a:schemeClr>
+          </a:lnRef>
+          <a:fillRef idx="1">
+            <a:schemeClr val="accent1"/>
+          </a:fillRef>
+          <a:effectRef idx="0">
+            <a:schemeClr val="accent1"/>
+          </a:effectRef>
+          <a:fontRef idx="minor">
+            <a:schemeClr val="lt1"/>
+          </a:fontRef>
+        </p:style>
+        <p:txBody>
+          <a:bodyPr rtlCol="0" anchor="ctr"/>
+          <a:lstStyle/>
+          <a:p>
+            <a:pPr algn="ctr"/>
+            <a:endParaRPr lang="en-US"/>
+          </a:p>
+        </p:txBody>
+      </p:sp>
+      <p:sp>
+        <p:nvSpPr>
+          <p:cNvPr id="31" name="Right Arrow 30"/>
+          <p:cNvSpPr/>
+          <p:nvPr/>
+        </p:nvSpPr>
+        <p:spPr>
+          <a:xfrm rot="1978084">
+            <a:off x="6627264" y="4797988"/>
+            <a:ext cx="747453" cy="290146"/>
+          </a:xfrm>
+          <a:prstGeom prst="rightArrow">
+            <a:avLst/>
+          </a:prstGeom>
+          <a:solidFill>
+            <a:schemeClr val="tx1"/>
+          </a:solidFill>
+          <a:ln>
+            <a:solidFill>
+              <a:schemeClr val="tx1"/>
+            </a:solidFill>
+          </a:ln>
+        </p:spPr>
+        <p:style>
+          <a:lnRef idx="2">
+            <a:schemeClr val="accent1">
+              <a:shade val="50000"/>
+            </a:schemeClr>
+          </a:lnRef>
+          <a:fillRef idx="1">
+            <a:schemeClr val="accent1"/>
+          </a:fillRef>
+          <a:effectRef idx="0">
+            <a:schemeClr val="accent1"/>
+          </a:effectRef>
+          <a:fontRef idx="minor">
+            <a:schemeClr val="lt1"/>
+          </a:fontRef>
+        </p:style>
+        <p:txBody>
+          <a:bodyPr rtlCol="0" anchor="ctr"/>
+          <a:lstStyle/>
+          <a:p>
+            <a:pPr algn="ctr"/>
+            <a:endParaRPr lang="en-US"/>
+          </a:p>
+        </p:txBody>
+      </p:sp>
+      <p:sp>
+        <p:nvSpPr>
+          <p:cNvPr id="32" name="Right Arrow 31"/>
+          <p:cNvSpPr/>
+          <p:nvPr/>
+        </p:nvSpPr>
+        <p:spPr>
+          <a:xfrm rot="19098506">
+            <a:off x="6524363" y="3071862"/>
+            <a:ext cx="884653" cy="290146"/>
+          </a:xfrm>
+          <a:prstGeom prst="rightArrow">
+            <a:avLst/>
+          </a:prstGeom>
+          <a:solidFill>
+            <a:schemeClr val="tx1"/>
+          </a:solidFill>
+          <a:ln>
+            <a:solidFill>
+              <a:schemeClr val="tx1"/>
+            </a:solidFill>
+          </a:ln>
+        </p:spPr>
+        <p:style>
+          <a:lnRef idx="2">
+            <a:schemeClr val="accent1">
+              <a:shade val="50000"/>
+            </a:schemeClr>
+          </a:lnRef>
+          <a:fillRef idx="1">
+            <a:schemeClr val="accent1"/>
+          </a:fillRef>
+          <a:effectRef idx="0">
+            <a:schemeClr val="accent1"/>
+          </a:effectRef>
+          <a:fontRef idx="minor">
+            <a:schemeClr val="lt1"/>
+          </a:fontRef>
+        </p:style>
+        <p:txBody>
+          <a:bodyPr rtlCol="0" anchor="ctr"/>
+          <a:lstStyle/>
+          <a:p>
+            <a:pPr algn="ctr"/>
+            <a:endParaRPr lang="en-US"/>
+          </a:p>
+        </p:txBody>
+      </p:sp>
+      <p:sp>
+        <p:nvSpPr>
+          <p:cNvPr id="33" name="Right Arrow 32"/>
+          <p:cNvSpPr/>
+          <p:nvPr/>
+        </p:nvSpPr>
+        <p:spPr>
+          <a:xfrm>
+            <a:off x="6612348" y="3954914"/>
+            <a:ext cx="626830" cy="290146"/>
+          </a:xfrm>
+          <a:prstGeom prst="rightArrow">
+            <a:avLst/>
+          </a:prstGeom>
+          <a:solidFill>
+            <a:schemeClr val="tx1"/>
+          </a:solidFill>
+          <a:ln>
+            <a:solidFill>
+              <a:schemeClr val="tx1"/>
+            </a:solidFill>
+          </a:ln>
+        </p:spPr>
+        <p:style>
+          <a:lnRef idx="2">
+            <a:schemeClr val="accent1">
+              <a:shade val="50000"/>
+            </a:schemeClr>
+          </a:lnRef>
+          <a:fillRef idx="1">
+            <a:schemeClr val="accent1"/>
+          </a:fillRef>
+          <a:effectRef idx="0">
+            <a:schemeClr val="accent1"/>
+          </a:effectRef>
+          <a:fontRef idx="minor">
+            <a:schemeClr val="lt1"/>
+          </a:fontRef>
+        </p:style>
+        <p:txBody>
+          <a:bodyPr rtlCol="0" anchor="ctr"/>
+          <a:lstStyle/>
+          <a:p>
+            <a:pPr algn="ctr"/>
+            <a:endParaRPr lang="en-US"/>
           </a:p>
         </p:txBody>
       </p:sp>
     </p:spTree>
     <p:extLst>
       <p:ext uri="{BB962C8B-B14F-4D97-AF65-F5344CB8AC3E}">
-        <p14:creationId xmlns:p14="http://schemas.microsoft.com/office/powerpoint/2010/main" val="1629068860"/>
+        <p14:creationId xmlns:p14="http://schemas.microsoft.com/office/powerpoint/2010/main" val="2342300817"/>
       </p:ext>
     </p:extLst>
   </p:cSld>
@@ -4519,7 +6201,7 @@
           <a:p>
             <a:r>
               <a:rPr lang="en-US" dirty="0" smtClean="0"/>
-              <a:t>Pipeline</a:t>
+              <a:t>Workflow</a:t>
             </a:r>
             <a:endParaRPr lang="en-US" dirty="0"/>
           </a:p>
@@ -4537,7 +6219,9 @@
         </p:nvSpPr>
         <p:spPr/>
         <p:txBody>
-          <a:bodyPr/>
+          <a:bodyPr>
+            <a:normAutofit lnSpcReduction="10000"/>
+          </a:bodyPr>
           <a:lstStyle/>
           <a:p>
             <a:pPr lvl="1">
@@ -4545,10 +6229,29 @@
               <a:buChar char="§"/>
             </a:pPr>
             <a:r>
-              <a:rPr lang="en-US" dirty="0" err="1" smtClean="0"/>
-              <a:t>Git</a:t>
-            </a:r>
-            <a:endParaRPr lang="en-US" dirty="0" smtClean="0"/>
+              <a:rPr lang="en-US" b="1" dirty="0" smtClean="0"/>
+              <a:t>A single Project is used to prioritize tasks</a:t>
+            </a:r>
+          </a:p>
+          <a:p>
+            <a:pPr lvl="2">
+              <a:buFont typeface="Wingdings" panose="05000000000000000000" pitchFamily="2" charset="2"/>
+              <a:buChar char="§"/>
+            </a:pPr>
+            <a:r>
+              <a:rPr lang="en-US" dirty="0" smtClean="0"/>
+              <a:t>Using the Kanban template with automation (cards move on their own as a result of certain actions)</a:t>
+            </a:r>
+          </a:p>
+          <a:p>
+            <a:pPr lvl="2">
+              <a:buFont typeface="Wingdings" panose="05000000000000000000" pitchFamily="2" charset="2"/>
+              <a:buChar char="§"/>
+            </a:pPr>
+            <a:r>
+              <a:rPr lang="en-US" dirty="0" smtClean="0"/>
+              <a:t>Milestones are used to track major versions and dates</a:t>
+            </a:r>
           </a:p>
           <a:p>
             <a:pPr lvl="1">
@@ -4556,8 +6259,38 @@
               <a:buChar char="§"/>
             </a:pPr>
             <a:r>
+              <a:rPr lang="en-US" b="1" dirty="0" smtClean="0"/>
+              <a:t>Issues are created to track individual tasks</a:t>
+            </a:r>
+          </a:p>
+          <a:p>
+            <a:pPr lvl="2">
+              <a:buFont typeface="Wingdings" panose="05000000000000000000" pitchFamily="2" charset="2"/>
+              <a:buChar char="§"/>
+            </a:pPr>
+            <a:r>
               <a:rPr lang="en-US" dirty="0" smtClean="0"/>
-              <a:t>GitHub</a:t>
+              <a:t>Relevant labels are added to help determine the nature of the issue (bug, new feature, technical debt, etc.)</a:t>
+            </a:r>
+          </a:p>
+          <a:p>
+            <a:pPr lvl="2">
+              <a:buFont typeface="Wingdings" panose="05000000000000000000" pitchFamily="2" charset="2"/>
+              <a:buChar char="§"/>
+            </a:pPr>
+            <a:r>
+              <a:rPr lang="en-US" dirty="0" smtClean="0"/>
+              <a:t>Added to the Project under ‘Project Backlog’ by default</a:t>
+            </a:r>
+          </a:p>
+          <a:p>
+            <a:pPr lvl="2">
+              <a:buFont typeface="Wingdings" panose="05000000000000000000" pitchFamily="2" charset="2"/>
+              <a:buChar char="§"/>
+            </a:pPr>
+            <a:r>
+              <a:rPr lang="en-US" dirty="0" smtClean="0"/>
+              <a:t>Added to the appropriate milestone</a:t>
             </a:r>
           </a:p>
           <a:p>
@@ -4566,8 +6299,18 @@
               <a:buChar char="§"/>
             </a:pPr>
             <a:r>
+              <a:rPr lang="en-US" b="1" dirty="0" smtClean="0"/>
+              <a:t>Issues are prioritized</a:t>
+            </a:r>
+          </a:p>
+          <a:p>
+            <a:pPr lvl="2">
+              <a:buFont typeface="Wingdings" panose="05000000000000000000" pitchFamily="2" charset="2"/>
+              <a:buChar char="§"/>
+            </a:pPr>
+            <a:r>
               <a:rPr lang="en-US" dirty="0" smtClean="0"/>
-              <a:t>Travis CI</a:t>
+              <a:t>More urgent or higher priority issues are moved to ‘Sprint Backlog’</a:t>
             </a:r>
           </a:p>
           <a:p>
@@ -4576,8 +6319,28 @@
               <a:buChar char="§"/>
             </a:pPr>
             <a:r>
+              <a:rPr lang="en-US" b="1" dirty="0" smtClean="0"/>
+              <a:t>Issues are assigned when work begins</a:t>
+            </a:r>
+          </a:p>
+          <a:p>
+            <a:pPr lvl="2">
+              <a:buFont typeface="Wingdings" panose="05000000000000000000" pitchFamily="2" charset="2"/>
+              <a:buChar char="§"/>
+            </a:pPr>
+            <a:r>
               <a:rPr lang="en-US" dirty="0" smtClean="0"/>
-              <a:t>Deploy to AWS Lambda</a:t>
+              <a:t>The person handling the issue assigns themselves to the issue</a:t>
+            </a:r>
+          </a:p>
+          <a:p>
+            <a:pPr lvl="2">
+              <a:buFont typeface="Wingdings" panose="05000000000000000000" pitchFamily="2" charset="2"/>
+              <a:buChar char="§"/>
+            </a:pPr>
+            <a:r>
+              <a:rPr lang="en-US" dirty="0" smtClean="0"/>
+              <a:t>The Project issue for the card is moved from ‘Sprint Backlog’ to ‘In Progress’</a:t>
             </a:r>
           </a:p>
           <a:p>
@@ -4586,8 +6349,28 @@
               <a:buChar char="§"/>
             </a:pPr>
             <a:r>
+              <a:rPr lang="en-US" b="1" dirty="0" smtClean="0"/>
+              <a:t>Pull Requests (PRs) are used to merge code changes</a:t>
+            </a:r>
+          </a:p>
+          <a:p>
+            <a:pPr lvl="2">
+              <a:buFont typeface="Wingdings" panose="05000000000000000000" pitchFamily="2" charset="2"/>
+              <a:buChar char="§"/>
+            </a:pPr>
+            <a:r>
               <a:rPr lang="en-US" dirty="0" smtClean="0"/>
-              <a:t>Deploy to AWS S3</a:t>
+              <a:t>The PR title should roughly match the issue(s) it addresses</a:t>
+            </a:r>
+          </a:p>
+          <a:p>
+            <a:pPr lvl="2">
+              <a:buFont typeface="Wingdings" panose="05000000000000000000" pitchFamily="2" charset="2"/>
+              <a:buChar char="§"/>
+            </a:pPr>
+            <a:r>
+              <a:rPr lang="en-US" dirty="0" smtClean="0"/>
+              <a:t>If an issue is resolved by the PR, the text “closes #NNN” is added to the description to automatically close the issue upon merge</a:t>
             </a:r>
           </a:p>
           <a:p>
@@ -4595,27 +6378,14 @@
               <a:buFont typeface="Wingdings" panose="05000000000000000000" pitchFamily="2" charset="2"/>
               <a:buChar char="§"/>
             </a:pPr>
-            <a:r>
-              <a:rPr lang="en-US" dirty="0" smtClean="0"/>
-              <a:t>Manual database deployments</a:t>
-            </a:r>
-          </a:p>
-          <a:p>
-            <a:pPr lvl="1">
-              <a:buFont typeface="Wingdings" panose="05000000000000000000" pitchFamily="2" charset="2"/>
-              <a:buChar char="§"/>
-            </a:pPr>
-            <a:r>
-              <a:rPr lang="en-US" dirty="0" smtClean="0"/>
-              <a:t>Manual google play deployments</a:t>
-            </a:r>
+            <a:endParaRPr lang="en-US" dirty="0" smtClean="0"/>
           </a:p>
         </p:txBody>
       </p:sp>
     </p:spTree>
     <p:extLst>
       <p:ext uri="{BB962C8B-B14F-4D97-AF65-F5344CB8AC3E}">
-        <p14:creationId xmlns:p14="http://schemas.microsoft.com/office/powerpoint/2010/main" val="2342300817"/>
+        <p14:creationId xmlns:p14="http://schemas.microsoft.com/office/powerpoint/2010/main" val="1629068860"/>
       </p:ext>
     </p:extLst>
   </p:cSld>
@@ -4665,25 +6435,47 @@
           </a:p>
         </p:txBody>
       </p:sp>
-      <p:sp>
-        <p:nvSpPr>
-          <p:cNvPr id="3" name="Content Placeholder 2"/>
-          <p:cNvSpPr>
-            <a:spLocks noGrp="1"/>
-          </p:cNvSpPr>
-          <p:nvPr>
-            <p:ph idx="1"/>
-          </p:nvPr>
-        </p:nvSpPr>
-        <p:spPr/>
-        <p:txBody>
-          <a:bodyPr/>
-          <a:lstStyle/>
-          <a:p>
-            <a:endParaRPr lang="en-US"/>
-          </a:p>
-        </p:txBody>
-      </p:sp>
+      <p:pic>
+        <p:nvPicPr>
+          <p:cNvPr id="1028" name="Picture 4" descr="Image result for trump podium"/>
+          <p:cNvPicPr>
+            <a:picLocks noChangeAspect="1" noChangeArrowheads="1"/>
+          </p:cNvPicPr>
+          <p:nvPr/>
+        </p:nvPicPr>
+        <p:blipFill>
+          <a:blip r:embed="rId2">
+            <a:extLst>
+              <a:ext uri="{28A0092B-C50C-407E-A947-70E740481C1C}">
+                <a14:useLocalDpi xmlns:a14="http://schemas.microsoft.com/office/drawing/2010/main" val="0"/>
+              </a:ext>
+            </a:extLst>
+          </a:blip>
+          <a:srcRect/>
+          <a:stretch>
+            <a:fillRect/>
+          </a:stretch>
+        </p:blipFill>
+        <p:spPr bwMode="auto">
+          <a:xfrm>
+            <a:off x="2378392" y="1954824"/>
+            <a:ext cx="7496175" cy="4219575"/>
+          </a:xfrm>
+          <a:prstGeom prst="rect">
+            <a:avLst/>
+          </a:prstGeom>
+          <a:noFill/>
+          <a:extLst>
+            <a:ext uri="{909E8E84-426E-40DD-AFC4-6F175D3DCCD1}">
+              <a14:hiddenFill xmlns:a14="http://schemas.microsoft.com/office/drawing/2010/main">
+                <a:solidFill>
+                  <a:srgbClr val="FFFFFF"/>
+                </a:solidFill>
+              </a14:hiddenFill>
+            </a:ext>
+          </a:extLst>
+        </p:spPr>
+      </p:pic>
     </p:spTree>
     <p:extLst>
       <p:ext uri="{BB962C8B-B14F-4D97-AF65-F5344CB8AC3E}">

</xml_diff>